<commit_message>
uploaded to speakerdeck: https://speakerdeck.com/yoavram/introduction-to-python
</commit_message>
<xml_diff>
--- a/docs/Introduction to Python.pptx
+++ b/docs/Introduction to Python.pptx
@@ -47,6 +47,7 @@
     <p:sldId id="285" r:id="rId41"/>
     <p:sldId id="297" r:id="rId42"/>
     <p:sldId id="299" r:id="rId43"/>
+    <p:sldId id="301" r:id="rId44"/>
   </p:sldIdLst>
   <p:sldSz cx="9144000" cy="6858000" type="screen4x3"/>
   <p:notesSz cx="6858000" cy="9144000"/>
@@ -329,7 +330,7 @@
           <a:p>
             <a:fld id="{749D2849-5570-4342-91BD-2F06611478A8}" type="datetimeFigureOut">
               <a:rPr lang="he-IL" smtClean="0"/>
-              <a:t>י"ח/אדר א/תשע"ו</a:t>
+              <a:t>כ"ט/אדר א/תשע"ו</a:t>
             </a:fld>
             <a:endParaRPr lang="he-IL"/>
           </a:p>
@@ -499,7 +500,7 @@
           <a:p>
             <a:fld id="{749D2849-5570-4342-91BD-2F06611478A8}" type="datetimeFigureOut">
               <a:rPr lang="he-IL" smtClean="0"/>
-              <a:t>י"ח/אדר א/תשע"ו</a:t>
+              <a:t>כ"ט/אדר א/תשע"ו</a:t>
             </a:fld>
             <a:endParaRPr lang="he-IL"/>
           </a:p>
@@ -679,7 +680,7 @@
           <a:p>
             <a:fld id="{749D2849-5570-4342-91BD-2F06611478A8}" type="datetimeFigureOut">
               <a:rPr lang="he-IL" smtClean="0"/>
-              <a:t>י"ח/אדר א/תשע"ו</a:t>
+              <a:t>כ"ט/אדר א/תשע"ו</a:t>
             </a:fld>
             <a:endParaRPr lang="he-IL"/>
           </a:p>
@@ -849,7 +850,7 @@
           <a:p>
             <a:fld id="{749D2849-5570-4342-91BD-2F06611478A8}" type="datetimeFigureOut">
               <a:rPr lang="he-IL" smtClean="0"/>
-              <a:t>י"ח/אדר א/תשע"ו</a:t>
+              <a:t>כ"ט/אדר א/תשע"ו</a:t>
             </a:fld>
             <a:endParaRPr lang="he-IL"/>
           </a:p>
@@ -1095,7 +1096,7 @@
           <a:p>
             <a:fld id="{749D2849-5570-4342-91BD-2F06611478A8}" type="datetimeFigureOut">
               <a:rPr lang="he-IL" smtClean="0"/>
-              <a:t>י"ח/אדר א/תשע"ו</a:t>
+              <a:t>כ"ט/אדר א/תשע"ו</a:t>
             </a:fld>
             <a:endParaRPr lang="he-IL"/>
           </a:p>
@@ -1383,7 +1384,7 @@
           <a:p>
             <a:fld id="{749D2849-5570-4342-91BD-2F06611478A8}" type="datetimeFigureOut">
               <a:rPr lang="he-IL" smtClean="0"/>
-              <a:t>י"ח/אדר א/תשע"ו</a:t>
+              <a:t>כ"ט/אדר א/תשע"ו</a:t>
             </a:fld>
             <a:endParaRPr lang="he-IL"/>
           </a:p>
@@ -1805,7 +1806,7 @@
           <a:p>
             <a:fld id="{749D2849-5570-4342-91BD-2F06611478A8}" type="datetimeFigureOut">
               <a:rPr lang="he-IL" smtClean="0"/>
-              <a:t>י"ח/אדר א/תשע"ו</a:t>
+              <a:t>כ"ט/אדר א/תשע"ו</a:t>
             </a:fld>
             <a:endParaRPr lang="he-IL"/>
           </a:p>
@@ -1923,7 +1924,7 @@
           <a:p>
             <a:fld id="{749D2849-5570-4342-91BD-2F06611478A8}" type="datetimeFigureOut">
               <a:rPr lang="he-IL" smtClean="0"/>
-              <a:t>י"ח/אדר א/תשע"ו</a:t>
+              <a:t>כ"ט/אדר א/תשע"ו</a:t>
             </a:fld>
             <a:endParaRPr lang="he-IL"/>
           </a:p>
@@ -2018,7 +2019,7 @@
           <a:p>
             <a:fld id="{749D2849-5570-4342-91BD-2F06611478A8}" type="datetimeFigureOut">
               <a:rPr lang="he-IL" smtClean="0"/>
-              <a:t>י"ח/אדר א/תשע"ו</a:t>
+              <a:t>כ"ט/אדר א/תשע"ו</a:t>
             </a:fld>
             <a:endParaRPr lang="he-IL"/>
           </a:p>
@@ -2295,7 +2296,7 @@
           <a:p>
             <a:fld id="{749D2849-5570-4342-91BD-2F06611478A8}" type="datetimeFigureOut">
               <a:rPr lang="he-IL" smtClean="0"/>
-              <a:t>י"ח/אדר א/תשע"ו</a:t>
+              <a:t>כ"ט/אדר א/תשע"ו</a:t>
             </a:fld>
             <a:endParaRPr lang="he-IL"/>
           </a:p>
@@ -2548,7 +2549,7 @@
           <a:p>
             <a:fld id="{749D2849-5570-4342-91BD-2F06611478A8}" type="datetimeFigureOut">
               <a:rPr lang="he-IL" smtClean="0"/>
-              <a:t>י"ח/אדר א/תשע"ו</a:t>
+              <a:t>כ"ט/אדר א/תשע"ו</a:t>
             </a:fld>
             <a:endParaRPr lang="he-IL"/>
           </a:p>
@@ -2761,7 +2762,7 @@
           <a:p>
             <a:fld id="{749D2849-5570-4342-91BD-2F06611478A8}" type="datetimeFigureOut">
               <a:rPr lang="he-IL" smtClean="0"/>
-              <a:t>י"ח/אדר א/תשע"ו</a:t>
+              <a:t>כ"ט/אדר א/תשע"ו</a:t>
             </a:fld>
             <a:endParaRPr lang="he-IL"/>
           </a:p>
@@ -3189,7 +3190,7 @@
         </p:nvSpPr>
         <p:spPr>
           <a:xfrm>
-            <a:off x="683568" y="-27384"/>
+            <a:off x="755576" y="-27384"/>
             <a:ext cx="7772400" cy="1470025"/>
           </a:xfrm>
         </p:spPr>
@@ -3261,7 +3262,7 @@
           <a:p>
             <a:pPr rtl="0"/>
             <a:r>
-              <a:rPr lang="en-US" dirty="0" smtClean="0">
+              <a:rPr lang="en-US" dirty="0">
                 <a:solidFill>
                   <a:schemeClr val="tx1">
                     <a:lumMod val="75000"/>
@@ -3270,13 +3271,13 @@
                 </a:solidFill>
                 <a:latin typeface="Arial Black" panose="020B0A04020102020204" pitchFamily="34" charset="0"/>
               </a:rPr>
-              <a:t>Feb 2016</a:t>
+              <a:t>Python Training</a:t>
             </a:r>
           </a:p>
           <a:p>
             <a:pPr rtl="0"/>
             <a:r>
-              <a:rPr lang="en-US" dirty="0" smtClean="0">
+              <a:rPr lang="en-US" dirty="0">
                 <a:solidFill>
                   <a:schemeClr val="tx1">
                     <a:lumMod val="75000"/>
@@ -3284,9 +3285,19 @@
                   </a:schemeClr>
                 </a:solidFill>
                 <a:latin typeface="Arial Black" panose="020B0A04020102020204" pitchFamily="34" charset="0"/>
+                <a:hlinkClick r:id="rId3"/>
               </a:rPr>
-              <a:t>http://python.yoavram.com</a:t>
-            </a:r>
+              <a:t>python.yoavram.com</a:t>
+            </a:r>
+            <a:endParaRPr lang="en-US" dirty="0">
+              <a:solidFill>
+                <a:schemeClr val="tx1">
+                  <a:lumMod val="75000"/>
+                  <a:lumOff val="25000"/>
+                </a:schemeClr>
+              </a:solidFill>
+              <a:latin typeface="Arial Black" panose="020B0A04020102020204" pitchFamily="34" charset="0"/>
+            </a:endParaRPr>
           </a:p>
         </p:txBody>
       </p:sp>
@@ -3299,7 +3310,7 @@
           <p:nvPr/>
         </p:nvPicPr>
         <p:blipFill>
-          <a:blip r:embed="rId3">
+          <a:blip r:embed="rId4">
             <a:extLst>
               <a:ext uri="{28A0092B-C50C-407E-A947-70E740481C1C}">
                 <a14:useLocalDpi xmlns:a14="http://schemas.microsoft.com/office/drawing/2010/main" val="0"/>
@@ -3340,7 +3351,7 @@
           <p:nvPr/>
         </p:nvPicPr>
         <p:blipFill>
-          <a:blip r:embed="rId4">
+          <a:blip r:embed="rId5">
             <a:extLst>
               <a:ext uri="{28A0092B-C50C-407E-A947-70E740481C1C}">
                 <a14:useLocalDpi xmlns:a14="http://schemas.microsoft.com/office/drawing/2010/main" val="0"/>
@@ -3393,6 +3404,37 @@
           </a:extLst>
         </p:spPr>
       </p:pic>
+      <p:sp>
+        <p:nvSpPr>
+          <p:cNvPr id="4" name="TextBox 3"/>
+          <p:cNvSpPr txBox="1"/>
+          <p:nvPr/>
+        </p:nvSpPr>
+        <p:spPr>
+          <a:xfrm>
+            <a:off x="7740352" y="620688"/>
+            <a:ext cx="1226458" cy="369332"/>
+          </a:xfrm>
+          <a:prstGeom prst="rect">
+            <a:avLst/>
+          </a:prstGeom>
+          <a:noFill/>
+        </p:spPr>
+        <p:txBody>
+          <a:bodyPr wrap="square" rtlCol="1">
+            <a:spAutoFit/>
+          </a:bodyPr>
+          <a:lstStyle/>
+          <a:p>
+            <a:pPr algn="ctr"/>
+            <a:r>
+              <a:rPr lang="en-US" dirty="0" smtClean="0"/>
+              <a:t>Feb 2016</a:t>
+            </a:r>
+            <a:endParaRPr lang="he-IL" dirty="0"/>
+          </a:p>
+        </p:txBody>
+      </p:sp>
     </p:spTree>
     <p:extLst>
       <p:ext uri="{BB962C8B-B14F-4D97-AF65-F5344CB8AC3E}">
@@ -4237,8 +4279,8 @@
         </p:nvSpPr>
         <p:spPr>
           <a:xfrm>
-            <a:off x="1679797" y="6309320"/>
-            <a:ext cx="7016216" cy="369332"/>
+            <a:off x="6999976" y="6309320"/>
+            <a:ext cx="1964512" cy="369332"/>
           </a:xfrm>
           <a:prstGeom prst="rect">
             <a:avLst/>
@@ -4250,9 +4292,18 @@
           </a:bodyPr>
           <a:lstStyle/>
           <a:p>
-            <a:r>
-              <a:rPr lang="en-GB" dirty="0" smtClean="0"/>
-              <a:t>http://www.mathworks.com/pricing-licensing/index.html?prodCode=ML</a:t>
+            <a:pPr rtl="0"/>
+            <a:r>
+              <a:rPr lang="en-GB" dirty="0" err="1" smtClean="0">
+                <a:hlinkClick r:id="rId2"/>
+              </a:rPr>
+              <a:t>MathWorks</a:t>
+            </a:r>
+            <a:r>
+              <a:rPr lang="en-GB" dirty="0" smtClean="0">
+                <a:hlinkClick r:id="rId2"/>
+              </a:rPr>
+              <a:t> Pricing</a:t>
             </a:r>
             <a:endParaRPr lang="he-IL" dirty="0"/>
           </a:p>
@@ -4472,7 +4523,7 @@
             </a:r>
             <a:r>
               <a:rPr lang="en-GB" dirty="0" smtClean="0"/>
-              <a:t> </a:t>
+              <a:t>, </a:t>
             </a:r>
             <a:r>
               <a:rPr lang="en-GB" dirty="0" err="1" smtClean="0">
@@ -4591,7 +4642,11 @@
             <a:pPr rtl="0"/>
             <a:r>
               <a:rPr lang="en-GB" dirty="0" smtClean="0"/>
-              <a:t>Python is used for</a:t>
+              <a:t>Python is used </a:t>
+            </a:r>
+            <a:r>
+              <a:rPr lang="en-GB" dirty="0" smtClean="0"/>
+              <a:t>for:</a:t>
             </a:r>
             <a:endParaRPr lang="en-GB" b="1" dirty="0" smtClean="0"/>
           </a:p>
@@ -4617,42 +4672,60 @@
             <a:pPr algn="l" rtl="0"/>
             <a:r>
               <a:rPr lang="en-US" dirty="0" smtClean="0"/>
-              <a:t>scientific computing</a:t>
+              <a:t>Scientific </a:t>
+            </a:r>
+            <a:r>
+              <a:rPr lang="en-US" dirty="0" smtClean="0"/>
+              <a:t>computing</a:t>
             </a:r>
           </a:p>
           <a:p>
             <a:pPr algn="l" rtl="0"/>
             <a:r>
               <a:rPr lang="en-US" dirty="0" smtClean="0"/>
-              <a:t>enterprise software</a:t>
+              <a:t>Enterprise </a:t>
+            </a:r>
+            <a:r>
+              <a:rPr lang="en-US" dirty="0" smtClean="0"/>
+              <a:t>software</a:t>
             </a:r>
           </a:p>
           <a:p>
             <a:pPr algn="l" rtl="0"/>
             <a:r>
               <a:rPr lang="en-US" dirty="0" smtClean="0"/>
-              <a:t>web design</a:t>
+              <a:t>Web </a:t>
+            </a:r>
+            <a:r>
+              <a:rPr lang="en-US" dirty="0" smtClean="0"/>
+              <a:t>design</a:t>
             </a:r>
           </a:p>
           <a:p>
             <a:pPr algn="l" rtl="0"/>
             <a:r>
               <a:rPr lang="en-US" dirty="0" smtClean="0"/>
-              <a:t>back end</a:t>
-            </a:r>
+              <a:t>Back-end</a:t>
+            </a:r>
+            <a:endParaRPr lang="en-US" dirty="0" smtClean="0"/>
           </a:p>
           <a:p>
             <a:pPr algn="l" rtl="0"/>
             <a:r>
               <a:rPr lang="en-US" dirty="0" smtClean="0"/>
-              <a:t>front end</a:t>
-            </a:r>
+              <a:t>Front-end</a:t>
+            </a:r>
+            <a:endParaRPr lang="en-US" dirty="0" smtClean="0"/>
           </a:p>
           <a:p>
             <a:pPr algn="l" rtl="0"/>
             <a:r>
               <a:rPr lang="en-US" dirty="0" smtClean="0"/>
-              <a:t>everything in between</a:t>
+              <a:t>Everything </a:t>
+            </a:r>
+            <a:r>
+              <a:rPr lang="en-US" dirty="0" smtClean="0"/>
+              <a:t>in between</a:t>
             </a:r>
           </a:p>
         </p:txBody>
@@ -4942,8 +5015,12 @@
               <a:buNone/>
             </a:pPr>
             <a:r>
+              <a:rPr lang="en-US" sz="2000" i="1" dirty="0" smtClean="0"/>
+              <a:t>Rian Hunter</a:t>
+            </a:r>
+            <a:r>
               <a:rPr lang="en-US" sz="2000" dirty="0" smtClean="0"/>
-              <a:t>Rian Hunter, a Dropbox Engineer presented at </a:t>
+              <a:t>, a Dropbox Engineer presented at </a:t>
             </a:r>
             <a:r>
               <a:rPr lang="en-US" sz="2000" dirty="0" err="1" smtClean="0"/>
@@ -5367,7 +5444,7 @@
             </a:r>
           </a:p>
           <a:p>
-            <a:pPr marL="514350" indent="-514350" algn="l" rtl="0">
+            <a:pPr marL="914400" lvl="1" indent="-514350" algn="l" rtl="0">
               <a:buFont typeface="+mj-lt"/>
               <a:buAutoNum type="arabicPeriod"/>
             </a:pPr>
@@ -5377,7 +5454,7 @@
             </a:r>
           </a:p>
           <a:p>
-            <a:pPr marL="514350" indent="-514350" algn="l" rtl="0">
+            <a:pPr marL="914400" lvl="1" indent="-514350" algn="l" rtl="0">
               <a:buFont typeface="+mj-lt"/>
               <a:buAutoNum type="arabicPeriod"/>
             </a:pPr>
@@ -5387,7 +5464,7 @@
             </a:r>
           </a:p>
           <a:p>
-            <a:pPr marL="514350" indent="-514350" algn="l" rtl="0">
+            <a:pPr marL="914400" lvl="1" indent="-514350" algn="l" rtl="0">
               <a:buFont typeface="+mj-lt"/>
               <a:buAutoNum type="arabicPeriod"/>
             </a:pPr>
@@ -5667,10 +5744,14 @@
             <p:ph idx="1"/>
           </p:nvPr>
         </p:nvSpPr>
-        <p:spPr/>
+        <p:spPr>
+          <a:ln>
+            <a:noFill/>
+          </a:ln>
+        </p:spPr>
         <p:txBody>
           <a:bodyPr>
-            <a:normAutofit fontScale="92500" lnSpcReduction="10000"/>
+            <a:normAutofit fontScale="77500" lnSpcReduction="20000"/>
           </a:bodyPr>
           <a:lstStyle/>
           <a:p>
@@ -5714,12 +5795,40 @@
             <a:endParaRPr lang="en-US" dirty="0"/>
           </a:p>
           <a:p>
-            <a:pPr marL="0" indent="0" algn="l" rtl="0">
+            <a:pPr marL="400050" lvl="1" indent="0" algn="l" rtl="0">
               <a:buNone/>
             </a:pPr>
             <a:r>
+              <a:rPr lang="en-US" i="1" dirty="0"/>
+              <a:t>A friend of mine who knows nearly all the widely used languages uses Python for most of his projects. He says the main reason is that </a:t>
+            </a:r>
+            <a:r>
+              <a:rPr lang="en-US" b="1" i="1" dirty="0"/>
+              <a:t>he likes the way source code looks</a:t>
+            </a:r>
+            <a:r>
+              <a:rPr lang="en-US" i="1" dirty="0"/>
+              <a:t>. That may seem a frivolous reason to choose one language over another. But it is not so frivolous as it sounds: when you program, </a:t>
+            </a:r>
+            <a:r>
+              <a:rPr lang="en-US" b="1" i="1" dirty="0"/>
+              <a:t>you spend more time reading code than writing it</a:t>
+            </a:r>
+            <a:r>
+              <a:rPr lang="en-US" i="1" dirty="0"/>
+              <a:t>. You push blobs of source code around the way a sculptor does blobs of clay. So a </a:t>
+            </a:r>
+            <a:r>
+              <a:rPr lang="en-US" b="1" i="1" dirty="0"/>
+              <a:t>language that makes source code ugly is maddening to an exacting programmer</a:t>
+            </a:r>
+            <a:r>
+              <a:rPr lang="en-US" i="1" dirty="0"/>
+              <a:t>, as clay full of lumps would be to a sculptor</a:t>
+            </a:r>
+            <a:r>
               <a:rPr lang="en-US" i="1" dirty="0" smtClean="0"/>
-              <a:t>…when you program, you spend more time reading code than writing it. You push blobs of source code around the way a sculptor does blobs of clay. So a language that makes source code ugly is maddening to an exacting programmer, as clay full of lumps would be to a sculptor.</a:t>
+              <a:t>.</a:t>
             </a:r>
             <a:endParaRPr lang="he-IL" i="1" dirty="0"/>
           </a:p>
@@ -5734,7 +5843,7 @@
         <p:spPr>
           <a:xfrm>
             <a:off x="5508104" y="6309320"/>
-            <a:ext cx="3493200" cy="369332"/>
+            <a:ext cx="3645485" cy="369332"/>
           </a:xfrm>
           <a:prstGeom prst="rect">
             <a:avLst/>
@@ -5748,10 +5857,10 @@
           <a:p>
             <a:pPr algn="l" rtl="0"/>
             <a:r>
-              <a:rPr lang="en-GB" dirty="0" smtClean="0">
-                <a:hlinkClick r:id="rId2"/>
+              <a:rPr lang="en-US" dirty="0" smtClean="0">
+                <a:hlinkClick r:id="rId2" action="ppaction://hlinkfile"/>
               </a:rPr>
-              <a:t>http://paulgraham.com/pypar.html</a:t>
+              <a:t>The Python Paradox, by Paul Graham</a:t>
             </a:r>
             <a:endParaRPr lang="he-IL" dirty="0"/>
           </a:p>
@@ -5890,9 +5999,24 @@
             <a:pPr algn="l" rtl="0"/>
             <a:r>
               <a:rPr lang="en-US" dirty="0" smtClean="0"/>
-              <a:t>The implied usefulness is that these things each have their own members and methods that encapsulate its functionality and information</a:t>
-            </a:r>
-            <a:endParaRPr lang="he-IL" dirty="0"/>
+              <a:t>The implied usefulness is that these things each have their own members and methods that encapsulate its functionality and </a:t>
+            </a:r>
+            <a:r>
+              <a:rPr lang="en-US" dirty="0" smtClean="0"/>
+              <a:t>information</a:t>
+            </a:r>
+          </a:p>
+          <a:p>
+            <a:pPr algn="l" rtl="0"/>
+            <a:r>
+              <a:rPr lang="en-US" dirty="0" smtClean="0"/>
+              <a:t>Strong </a:t>
+            </a:r>
+            <a:r>
+              <a:rPr lang="en-US" b="1" dirty="0" smtClean="0"/>
+              <a:t>polymorphism</a:t>
+            </a:r>
+            <a:endParaRPr lang="he-IL" b="1" dirty="0"/>
           </a:p>
         </p:txBody>
       </p:sp>
@@ -6043,10 +6167,10 @@
           <a:p>
             <a:pPr rtl="0"/>
             <a:r>
-              <a:rPr lang="en-GB" dirty="0" smtClean="0">
+              <a:rPr lang="en-US" dirty="0" smtClean="0">
                 <a:hlinkClick r:id="rId2"/>
               </a:rPr>
-              <a:t>http://stackoverflow.com/questions/101268/hidden-features-of-python</a:t>
+              <a:t>Stack overflow: Hidden features of Python</a:t>
             </a:r>
             <a:endParaRPr lang="he-IL" dirty="0"/>
           </a:p>
@@ -6090,8 +6214,8 @@
         </p:nvSpPr>
         <p:spPr>
           <a:xfrm>
-            <a:off x="6660232" y="6309320"/>
-            <a:ext cx="2315634" cy="369332"/>
+            <a:off x="7902160" y="6309320"/>
+            <a:ext cx="1086388" cy="369332"/>
           </a:xfrm>
           <a:prstGeom prst="rect">
             <a:avLst/>
@@ -6108,7 +6232,7 @@
               <a:rPr lang="en-GB" dirty="0" smtClean="0">
                 <a:hlinkClick r:id="rId2"/>
               </a:rPr>
-              <a:t>https://xkcd.com/353/</a:t>
+              <a:t>XKCD 353</a:t>
             </a:r>
             <a:endParaRPr lang="he-IL" dirty="0"/>
           </a:p>
@@ -6919,7 +7043,7 @@
               <a:rPr lang="en-US" sz="2400" dirty="0" smtClean="0">
                 <a:hlinkClick r:id="rId3"/>
               </a:rPr>
-              <a:t>http://stackoverflow.com/tags</a:t>
+              <a:t>stackoverflow.com/tags</a:t>
             </a:r>
             <a:r>
               <a:rPr lang="en-US" sz="2400" dirty="0" smtClean="0"/>
@@ -7314,8 +7438,8 @@
         </p:nvSpPr>
         <p:spPr>
           <a:xfrm>
-            <a:off x="539552" y="5178732"/>
-            <a:ext cx="8136904" cy="1200329"/>
+            <a:off x="323528" y="5178732"/>
+            <a:ext cx="8568952" cy="830997"/>
           </a:xfrm>
           <a:prstGeom prst="rect">
             <a:avLst/>
@@ -7331,46 +7455,57 @@
             <a:pPr algn="l" rtl="0"/>
             <a:r>
               <a:rPr lang="en-US" sz="2400" dirty="0" smtClean="0"/>
-              <a:t>During 2015, over 1,500 new packages released </a:t>
+              <a:t>During 2015, </a:t>
+            </a:r>
+            <a:r>
+              <a:rPr lang="en-US" sz="2400" dirty="0" smtClean="0"/>
+              <a:t>&gt; 1,500 </a:t>
+            </a:r>
+            <a:r>
+              <a:rPr lang="en-US" sz="2400" dirty="0" smtClean="0"/>
+              <a:t>new packages released </a:t>
             </a:r>
             <a:r>
               <a:rPr lang="en-US" sz="2400" u="sng" dirty="0" smtClean="0"/>
-              <a:t>every month </a:t>
+              <a:t>every month</a:t>
             </a:r>
             <a:r>
               <a:rPr lang="en-US" sz="2400" dirty="0" smtClean="0"/>
-              <a:t>at </a:t>
-            </a:r>
-            <a:r>
-              <a:rPr lang="en-US" sz="2400" dirty="0" err="1" smtClean="0"/>
-              <a:t>PyPI</a:t>
+              <a:t> </a:t>
             </a:r>
             <a:r>
               <a:rPr lang="en-US" sz="2400" dirty="0" smtClean="0"/>
-              <a:t> (</a:t>
-            </a:r>
-            <a:r>
-              <a:rPr lang="en-US" sz="2400" dirty="0" smtClean="0">
+              <a:t>to </a:t>
+            </a:r>
+            <a:r>
+              <a:rPr lang="en-US" sz="2400" dirty="0" err="1" smtClean="0">
                 <a:hlinkClick r:id="rId3"/>
               </a:rPr>
-              <a:t>http://pypi.python.org/</a:t>
+              <a:t>PyPI</a:t>
             </a:r>
             <a:r>
               <a:rPr lang="en-US" sz="2400" dirty="0" smtClean="0"/>
-              <a:t>). </a:t>
-            </a:r>
+              <a:t>. </a:t>
+            </a:r>
+            <a:endParaRPr lang="en-US" sz="2400" dirty="0" smtClean="0"/>
           </a:p>
           <a:p>
             <a:pPr algn="l" rtl="0"/>
             <a:r>
               <a:rPr lang="en-US" sz="2400" dirty="0" smtClean="0"/>
               <a:t>See more stats at </a:t>
+            </a:r>
+            <a:r>
+              <a:rPr lang="en-US" sz="2400" dirty="0" err="1" smtClean="0">
+                <a:hlinkClick r:id="rId4"/>
+              </a:rPr>
+              <a:t>PyGarden</a:t>
             </a:r>
             <a:r>
               <a:rPr lang="en-US" sz="2400" dirty="0" smtClean="0">
                 <a:hlinkClick r:id="rId4"/>
               </a:rPr>
-              <a:t>http://pygarden.com/stats</a:t>
+              <a:t>/stats</a:t>
             </a:r>
             <a:r>
               <a:rPr lang="en-US" sz="2400" dirty="0" smtClean="0"/>
@@ -7482,7 +7617,7 @@
             </a:r>
             <a:r>
               <a:rPr lang="en-US" dirty="0" err="1" smtClean="0"/>
-              <a:t>Ipython</a:t>
+              <a:t>IPython</a:t>
             </a:r>
             <a:r>
               <a:rPr lang="en-US" dirty="0" smtClean="0"/>
@@ -7664,7 +7799,7 @@
               <a:rPr lang="en-GB" dirty="0" smtClean="0">
                 <a:hlinkClick r:id="rId3"/>
               </a:rPr>
-              <a:t>http://www.codingdojo.com/blog/9-most-in-demand-programming-languages-of-2016</a:t>
+              <a:t>Coding Dojo</a:t>
             </a:r>
             <a:endParaRPr lang="he-IL" dirty="0"/>
           </a:p>
@@ -7700,44 +7835,6 @@
           <a:chExt cx="0" cy="0"/>
         </a:xfrm>
       </p:grpSpPr>
-      <p:sp>
-        <p:nvSpPr>
-          <p:cNvPr id="2" name="Title 1"/>
-          <p:cNvSpPr>
-            <a:spLocks noGrp="1"/>
-          </p:cNvSpPr>
-          <p:nvPr>
-            <p:ph type="title"/>
-          </p:nvPr>
-        </p:nvSpPr>
-        <p:spPr/>
-        <p:txBody>
-          <a:bodyPr/>
-          <a:lstStyle/>
-          <a:p>
-            <a:endParaRPr lang="he-IL"/>
-          </a:p>
-        </p:txBody>
-      </p:sp>
-      <p:sp>
-        <p:nvSpPr>
-          <p:cNvPr id="3" name="Content Placeholder 2"/>
-          <p:cNvSpPr>
-            <a:spLocks noGrp="1"/>
-          </p:cNvSpPr>
-          <p:nvPr>
-            <p:ph idx="1"/>
-          </p:nvPr>
-        </p:nvSpPr>
-        <p:spPr/>
-        <p:txBody>
-          <a:bodyPr/>
-          <a:lstStyle/>
-          <a:p>
-            <a:endParaRPr lang="he-IL"/>
-          </a:p>
-        </p:txBody>
-      </p:sp>
       <p:sp>
         <p:nvSpPr>
           <p:cNvPr id="4" name="AutoShape 2" descr="http://cacm.acm.org/system/assets/0001/6722/Top39-700.4.png"/>
@@ -7839,8 +7936,8 @@
         </p:nvSpPr>
         <p:spPr>
           <a:xfrm>
-            <a:off x="179512" y="6167045"/>
-            <a:ext cx="8856984" cy="646331"/>
+            <a:off x="251520" y="6381328"/>
+            <a:ext cx="8856984" cy="369332"/>
           </a:xfrm>
           <a:prstGeom prst="rect">
             <a:avLst/>
@@ -7857,7 +7954,7 @@
               <a:rPr lang="en-GB" dirty="0" smtClean="0">
                 <a:hlinkClick r:id="rId3"/>
               </a:rPr>
-              <a:t>http://cacm.acm.org/blogs/blog-cacm/176450-python-is-now-the-most-popular-introductory-teaching-language-at-top-us-universities/fulltext</a:t>
+              <a:t>Phillip Gou @ CACM</a:t>
             </a:r>
             <a:endParaRPr lang="he-IL" dirty="0"/>
           </a:p>
@@ -8691,7 +8788,7 @@
               <a:rPr lang="en-US" dirty="0" smtClean="0">
                 <a:hlinkClick r:id="rId2"/>
               </a:rPr>
-              <a:t>https://www.python.org/about/</a:t>
+              <a:t>python.org/about</a:t>
             </a:r>
             <a:endParaRPr lang="he-IL" dirty="0"/>
           </a:p>
@@ -8707,6 +8804,248 @@
   <p:clrMapOvr>
     <a:masterClrMapping/>
   </p:clrMapOvr>
+</p:sld>
+</file>
+
+<file path=ppt/slides/slide43.xml><?xml version="1.0" encoding="utf-8"?>
+<p:sld xmlns:a="http://schemas.openxmlformats.org/drawingml/2006/main" xmlns:r="http://schemas.openxmlformats.org/officeDocument/2006/relationships" xmlns:p="http://schemas.openxmlformats.org/presentationml/2006/main">
+  <p:cSld>
+    <p:spTree>
+      <p:nvGrpSpPr>
+        <p:cNvPr id="1" name=""/>
+        <p:cNvGrpSpPr/>
+        <p:nvPr/>
+      </p:nvGrpSpPr>
+      <p:grpSpPr>
+        <a:xfrm>
+          <a:off x="0" y="0"/>
+          <a:ext cx="0" cy="0"/>
+          <a:chOff x="0" y="0"/>
+          <a:chExt cx="0" cy="0"/>
+        </a:xfrm>
+      </p:grpSpPr>
+      <p:sp>
+        <p:nvSpPr>
+          <p:cNvPr id="3" name="Subtitle 2"/>
+          <p:cNvSpPr>
+            <a:spLocks noGrp="1"/>
+          </p:cNvSpPr>
+          <p:nvPr>
+            <p:ph type="subTitle" idx="1"/>
+          </p:nvPr>
+        </p:nvSpPr>
+        <p:spPr>
+          <a:xfrm>
+            <a:off x="683568" y="3692624"/>
+            <a:ext cx="7776864" cy="1752600"/>
+          </a:xfrm>
+        </p:spPr>
+        <p:txBody>
+          <a:bodyPr>
+            <a:noAutofit/>
+          </a:bodyPr>
+          <a:lstStyle/>
+          <a:p>
+            <a:pPr rtl="0"/>
+            <a:r>
+              <a:rPr lang="en-US" sz="3600" dirty="0">
+                <a:solidFill>
+                  <a:schemeClr val="tx1">
+                    <a:lumMod val="75000"/>
+                    <a:lumOff val="25000"/>
+                  </a:schemeClr>
+                </a:solidFill>
+                <a:latin typeface="Arial Black" panose="020B0A04020102020204" pitchFamily="34" charset="0"/>
+              </a:rPr>
+              <a:t>Yoav </a:t>
+            </a:r>
+            <a:r>
+              <a:rPr lang="en-US" sz="3600" dirty="0" smtClean="0">
+                <a:solidFill>
+                  <a:schemeClr val="tx1">
+                    <a:lumMod val="75000"/>
+                    <a:lumOff val="25000"/>
+                  </a:schemeClr>
+                </a:solidFill>
+                <a:latin typeface="Arial Black" panose="020B0A04020102020204" pitchFamily="34" charset="0"/>
+              </a:rPr>
+              <a:t>Ram</a:t>
+            </a:r>
+          </a:p>
+          <a:p>
+            <a:pPr rtl="0"/>
+            <a:r>
+              <a:rPr lang="en-US" sz="3600" dirty="0" smtClean="0">
+                <a:solidFill>
+                  <a:schemeClr val="tx1">
+                    <a:lumMod val="75000"/>
+                    <a:lumOff val="25000"/>
+                  </a:schemeClr>
+                </a:solidFill>
+                <a:latin typeface="Arial Black" panose="020B0A04020102020204" pitchFamily="34" charset="0"/>
+              </a:rPr>
+              <a:t>Python Training</a:t>
+            </a:r>
+          </a:p>
+          <a:p>
+            <a:pPr rtl="0"/>
+            <a:endParaRPr lang="en-US" sz="3600" dirty="0">
+              <a:solidFill>
+                <a:schemeClr val="tx1">
+                  <a:lumMod val="75000"/>
+                  <a:lumOff val="25000"/>
+                </a:schemeClr>
+              </a:solidFill>
+              <a:latin typeface="Arial Black" panose="020B0A04020102020204" pitchFamily="34" charset="0"/>
+            </a:endParaRPr>
+          </a:p>
+          <a:p>
+            <a:pPr rtl="0"/>
+            <a:r>
+              <a:rPr lang="en-US" sz="3600" dirty="0" smtClean="0">
+                <a:solidFill>
+                  <a:schemeClr val="tx1">
+                    <a:lumMod val="75000"/>
+                    <a:lumOff val="25000"/>
+                  </a:schemeClr>
+                </a:solidFill>
+                <a:latin typeface="Arial Black" panose="020B0A04020102020204" pitchFamily="34" charset="0"/>
+                <a:hlinkClick r:id="rId2"/>
+              </a:rPr>
+              <a:t>python.yoavram.com</a:t>
+            </a:r>
+            <a:endParaRPr lang="en-US" sz="3600" dirty="0" smtClean="0">
+              <a:solidFill>
+                <a:schemeClr val="tx1">
+                  <a:lumMod val="75000"/>
+                  <a:lumOff val="25000"/>
+                </a:schemeClr>
+              </a:solidFill>
+              <a:latin typeface="Arial Black" panose="020B0A04020102020204" pitchFamily="34" charset="0"/>
+            </a:endParaRPr>
+          </a:p>
+        </p:txBody>
+      </p:sp>
+      <p:pic>
+        <p:nvPicPr>
+          <p:cNvPr id="1026" name="Picture 2" descr="Creative Commons License"/>
+          <p:cNvPicPr>
+            <a:picLocks noChangeAspect="1" noChangeArrowheads="1"/>
+          </p:cNvPicPr>
+          <p:nvPr/>
+        </p:nvPicPr>
+        <p:blipFill>
+          <a:blip r:embed="rId3">
+            <a:extLst>
+              <a:ext uri="{28A0092B-C50C-407E-A947-70E740481C1C}">
+                <a14:useLocalDpi xmlns:a14="http://schemas.microsoft.com/office/drawing/2010/main" val="0"/>
+              </a:ext>
+            </a:extLst>
+          </a:blip>
+          <a:srcRect/>
+          <a:stretch>
+            <a:fillRect/>
+          </a:stretch>
+        </p:blipFill>
+        <p:spPr bwMode="auto">
+          <a:xfrm>
+            <a:off x="7740352" y="188640"/>
+            <a:ext cx="1226458" cy="432048"/>
+          </a:xfrm>
+          <a:prstGeom prst="rect">
+            <a:avLst/>
+          </a:prstGeom>
+          <a:noFill/>
+          <a:extLst>
+            <a:ext uri="{909E8E84-426E-40DD-AFC4-6F175D3DCCD1}">
+              <a14:hiddenFill xmlns:a14="http://schemas.microsoft.com/office/drawing/2010/main">
+                <a:solidFill>
+                  <a:srgbClr val="FFFFFF"/>
+                </a:solidFill>
+              </a14:hiddenFill>
+            </a:ext>
+          </a:extLst>
+        </p:spPr>
+      </p:pic>
+      <p:pic>
+        <p:nvPicPr>
+          <p:cNvPr id="1027" name="Picture 3" descr="D:\workspace\python.yoavram.com\www\img\logo.png"/>
+          <p:cNvPicPr>
+            <a:picLocks noChangeAspect="1" noChangeArrowheads="1"/>
+          </p:cNvPicPr>
+          <p:nvPr/>
+        </p:nvPicPr>
+        <p:blipFill>
+          <a:blip r:embed="rId4">
+            <a:extLst>
+              <a:ext uri="{28A0092B-C50C-407E-A947-70E740481C1C}">
+                <a14:useLocalDpi xmlns:a14="http://schemas.microsoft.com/office/drawing/2010/main" val="0"/>
+              </a:ext>
+            </a:extLst>
+          </a:blip>
+          <a:srcRect/>
+          <a:stretch>
+            <a:fillRect/>
+          </a:stretch>
+        </p:blipFill>
+        <p:spPr bwMode="auto">
+          <a:xfrm>
+            <a:off x="3628344" y="1700808"/>
+            <a:ext cx="1882848" cy="1882848"/>
+          </a:xfrm>
+          <a:prstGeom prst="ellipse">
+            <a:avLst/>
+          </a:prstGeom>
+          <a:ln w="63500" cap="rnd">
+            <a:noFill/>
+          </a:ln>
+          <a:effectLst>
+            <a:outerShdw blurRad="50800" dist="38100" dir="2700000" algn="tl" rotWithShape="0">
+              <a:prstClr val="black">
+                <a:alpha val="40000"/>
+              </a:prstClr>
+            </a:outerShdw>
+          </a:effectLst>
+          <a:scene3d>
+            <a:camera prst="orthographicFront"/>
+            <a:lightRig rig="contrasting" dir="t">
+              <a:rot lat="0" lon="0" rev="3000000"/>
+            </a:lightRig>
+          </a:scene3d>
+          <a:sp3d contourW="7620">
+            <a:bevelT w="95250" h="31750"/>
+            <a:contourClr>
+              <a:srgbClr val="333333"/>
+            </a:contourClr>
+          </a:sp3d>
+          <a:extLst>
+            <a:ext uri="{909E8E84-426E-40DD-AFC4-6F175D3DCCD1}">
+              <a14:hiddenFill xmlns:a14="http://schemas.microsoft.com/office/drawing/2010/main">
+                <a:solidFill>
+                  <a:srgbClr val="FFFFFF"/>
+                </a:solidFill>
+              </a14:hiddenFill>
+            </a:ext>
+          </a:extLst>
+        </p:spPr>
+      </p:pic>
+    </p:spTree>
+    <p:extLst>
+      <p:ext uri="{BB962C8B-B14F-4D97-AF65-F5344CB8AC3E}">
+        <p14:creationId xmlns:p14="http://schemas.microsoft.com/office/powerpoint/2010/main" val="3489182843"/>
+      </p:ext>
+    </p:extLst>
+  </p:cSld>
+  <p:clrMapOvr>
+    <a:masterClrMapping/>
+  </p:clrMapOvr>
+  <p:timing>
+    <p:tnLst>
+      <p:par>
+        <p:cTn id="1" dur="indefinite" restart="never" nodeType="tmRoot"/>
+      </p:par>
+    </p:tnLst>
+  </p:timing>
 </p:sld>
 </file>
 
@@ -8826,7 +9165,23 @@
             <a:pPr algn="l" rtl="0"/>
             <a:r>
               <a:rPr lang="en-US" dirty="0" smtClean="0"/>
-              <a:t>Asynchronous programming (especially v.3.5)</a:t>
+              <a:t>Asynchronous programming (especially </a:t>
+            </a:r>
+            <a:r>
+              <a:rPr lang="en-US" dirty="0" err="1" smtClean="0"/>
+              <a:t>Py</a:t>
+            </a:r>
+            <a:r>
+              <a:rPr lang="en-US" dirty="0" smtClean="0"/>
+              <a:t> </a:t>
+            </a:r>
+            <a:r>
+              <a:rPr lang="en-US" dirty="0" smtClean="0"/>
+              <a:t>3.5</a:t>
+            </a:r>
+            <a:r>
+              <a:rPr lang="en-US" dirty="0" smtClean="0"/>
+              <a:t>)</a:t>
             </a:r>
           </a:p>
         </p:txBody>
@@ -9073,21 +9428,21 @@
           <a:p>
             <a:pPr algn="l" rtl="0"/>
             <a:r>
-              <a:rPr lang="en-US" dirty="0" smtClean="0"/>
+              <a:rPr lang="en-US" sz="2800" dirty="0" smtClean="0"/>
               <a:t>Interpreters available for many operating systems</a:t>
             </a:r>
           </a:p>
           <a:p>
             <a:pPr algn="l" rtl="0"/>
             <a:r>
-              <a:rPr lang="en-US" dirty="0" smtClean="0"/>
+              <a:rPr lang="en-US" sz="2800" dirty="0" smtClean="0"/>
               <a:t>Code can be executed on a wide variety of systems</a:t>
             </a:r>
           </a:p>
           <a:p>
             <a:pPr algn="l" rtl="0"/>
             <a:r>
-              <a:rPr lang="en-US" dirty="0" smtClean="0"/>
+              <a:rPr lang="en-US" sz="2800" dirty="0" smtClean="0"/>
               <a:t>Code can be packaged into stand-alone executable programs</a:t>
             </a:r>
           </a:p>

</xml_diff>

<commit_message>
update for april, added il.pycon
</commit_message>
<xml_diff>
--- a/docs/Introduction to Python.pptx
+++ b/docs/Introduction to Python.pptx
@@ -38,16 +38,17 @@
     <p:sldId id="274" r:id="rId32"/>
     <p:sldId id="275" r:id="rId33"/>
     <p:sldId id="276" r:id="rId34"/>
-    <p:sldId id="277" r:id="rId35"/>
-    <p:sldId id="278" r:id="rId36"/>
-    <p:sldId id="280" r:id="rId37"/>
-    <p:sldId id="281" r:id="rId38"/>
-    <p:sldId id="284" r:id="rId39"/>
-    <p:sldId id="283" r:id="rId40"/>
-    <p:sldId id="285" r:id="rId41"/>
-    <p:sldId id="297" r:id="rId42"/>
-    <p:sldId id="299" r:id="rId43"/>
-    <p:sldId id="301" r:id="rId44"/>
+    <p:sldId id="302" r:id="rId35"/>
+    <p:sldId id="277" r:id="rId36"/>
+    <p:sldId id="278" r:id="rId37"/>
+    <p:sldId id="280" r:id="rId38"/>
+    <p:sldId id="281" r:id="rId39"/>
+    <p:sldId id="284" r:id="rId40"/>
+    <p:sldId id="283" r:id="rId41"/>
+    <p:sldId id="285" r:id="rId42"/>
+    <p:sldId id="297" r:id="rId43"/>
+    <p:sldId id="299" r:id="rId44"/>
+    <p:sldId id="301" r:id="rId45"/>
   </p:sldIdLst>
   <p:sldSz cx="9144000" cy="6858000" type="screen4x3"/>
   <p:notesSz cx="6858000" cy="9144000"/>
@@ -330,7 +331,7 @@
           <a:p>
             <a:fld id="{749D2849-5570-4342-91BD-2F06611478A8}" type="datetimeFigureOut">
               <a:rPr lang="he-IL" smtClean="0"/>
-              <a:t>כ"ט/אדר א/תשע"ו</a:t>
+              <a:t>ח'/ניסן/תשע"ו</a:t>
             </a:fld>
             <a:endParaRPr lang="he-IL"/>
           </a:p>
@@ -500,7 +501,7 @@
           <a:p>
             <a:fld id="{749D2849-5570-4342-91BD-2F06611478A8}" type="datetimeFigureOut">
               <a:rPr lang="he-IL" smtClean="0"/>
-              <a:t>כ"ט/אדר א/תשע"ו</a:t>
+              <a:t>ח'/ניסן/תשע"ו</a:t>
             </a:fld>
             <a:endParaRPr lang="he-IL"/>
           </a:p>
@@ -680,7 +681,7 @@
           <a:p>
             <a:fld id="{749D2849-5570-4342-91BD-2F06611478A8}" type="datetimeFigureOut">
               <a:rPr lang="he-IL" smtClean="0"/>
-              <a:t>כ"ט/אדר א/תשע"ו</a:t>
+              <a:t>ח'/ניסן/תשע"ו</a:t>
             </a:fld>
             <a:endParaRPr lang="he-IL"/>
           </a:p>
@@ -850,7 +851,7 @@
           <a:p>
             <a:fld id="{749D2849-5570-4342-91BD-2F06611478A8}" type="datetimeFigureOut">
               <a:rPr lang="he-IL" smtClean="0"/>
-              <a:t>כ"ט/אדר א/תשע"ו</a:t>
+              <a:t>ח'/ניסן/תשע"ו</a:t>
             </a:fld>
             <a:endParaRPr lang="he-IL"/>
           </a:p>
@@ -1096,7 +1097,7 @@
           <a:p>
             <a:fld id="{749D2849-5570-4342-91BD-2F06611478A8}" type="datetimeFigureOut">
               <a:rPr lang="he-IL" smtClean="0"/>
-              <a:t>כ"ט/אדר א/תשע"ו</a:t>
+              <a:t>ח'/ניסן/תשע"ו</a:t>
             </a:fld>
             <a:endParaRPr lang="he-IL"/>
           </a:p>
@@ -1384,7 +1385,7 @@
           <a:p>
             <a:fld id="{749D2849-5570-4342-91BD-2F06611478A8}" type="datetimeFigureOut">
               <a:rPr lang="he-IL" smtClean="0"/>
-              <a:t>כ"ט/אדר א/תשע"ו</a:t>
+              <a:t>ח'/ניסן/תשע"ו</a:t>
             </a:fld>
             <a:endParaRPr lang="he-IL"/>
           </a:p>
@@ -1806,7 +1807,7 @@
           <a:p>
             <a:fld id="{749D2849-5570-4342-91BD-2F06611478A8}" type="datetimeFigureOut">
               <a:rPr lang="he-IL" smtClean="0"/>
-              <a:t>כ"ט/אדר א/תשע"ו</a:t>
+              <a:t>ח'/ניסן/תשע"ו</a:t>
             </a:fld>
             <a:endParaRPr lang="he-IL"/>
           </a:p>
@@ -1924,7 +1925,7 @@
           <a:p>
             <a:fld id="{749D2849-5570-4342-91BD-2F06611478A8}" type="datetimeFigureOut">
               <a:rPr lang="he-IL" smtClean="0"/>
-              <a:t>כ"ט/אדר א/תשע"ו</a:t>
+              <a:t>ח'/ניסן/תשע"ו</a:t>
             </a:fld>
             <a:endParaRPr lang="he-IL"/>
           </a:p>
@@ -2019,7 +2020,7 @@
           <a:p>
             <a:fld id="{749D2849-5570-4342-91BD-2F06611478A8}" type="datetimeFigureOut">
               <a:rPr lang="he-IL" smtClean="0"/>
-              <a:t>כ"ט/אדר א/תשע"ו</a:t>
+              <a:t>ח'/ניסן/תשע"ו</a:t>
             </a:fld>
             <a:endParaRPr lang="he-IL"/>
           </a:p>
@@ -2296,7 +2297,7 @@
           <a:p>
             <a:fld id="{749D2849-5570-4342-91BD-2F06611478A8}" type="datetimeFigureOut">
               <a:rPr lang="he-IL" smtClean="0"/>
-              <a:t>כ"ט/אדר א/תשע"ו</a:t>
+              <a:t>ח'/ניסן/תשע"ו</a:t>
             </a:fld>
             <a:endParaRPr lang="he-IL"/>
           </a:p>
@@ -2549,7 +2550,7 @@
           <a:p>
             <a:fld id="{749D2849-5570-4342-91BD-2F06611478A8}" type="datetimeFigureOut">
               <a:rPr lang="he-IL" smtClean="0"/>
-              <a:t>כ"ט/אדר א/תשע"ו</a:t>
+              <a:t>ח'/ניסן/תשע"ו</a:t>
             </a:fld>
             <a:endParaRPr lang="he-IL"/>
           </a:p>
@@ -2762,7 +2763,7 @@
           <a:p>
             <a:fld id="{749D2849-5570-4342-91BD-2F06611478A8}" type="datetimeFigureOut">
               <a:rPr lang="he-IL" smtClean="0"/>
-              <a:t>כ"ט/אדר א/תשע"ו</a:t>
+              <a:t>ח'/ניסן/תשע"ו</a:t>
             </a:fld>
             <a:endParaRPr lang="he-IL"/>
           </a:p>
@@ -3429,7 +3430,7 @@
             <a:pPr algn="ctr"/>
             <a:r>
               <a:rPr lang="en-US" dirty="0" smtClean="0"/>
-              <a:t>Feb 2016</a:t>
+              <a:t>Apr 2016</a:t>
             </a:r>
             <a:endParaRPr lang="he-IL" dirty="0"/>
           </a:p>
@@ -4642,11 +4643,7 @@
             <a:pPr rtl="0"/>
             <a:r>
               <a:rPr lang="en-GB" dirty="0" smtClean="0"/>
-              <a:t>Python is used </a:t>
-            </a:r>
-            <a:r>
-              <a:rPr lang="en-GB" dirty="0" smtClean="0"/>
-              <a:t>for:</a:t>
+              <a:t>Python is used for:</a:t>
             </a:r>
             <a:endParaRPr lang="en-GB" b="1" dirty="0" smtClean="0"/>
           </a:p>
@@ -4672,33 +4669,21 @@
             <a:pPr algn="l" rtl="0"/>
             <a:r>
               <a:rPr lang="en-US" dirty="0" smtClean="0"/>
-              <a:t>Scientific </a:t>
-            </a:r>
-            <a:r>
-              <a:rPr lang="en-US" dirty="0" smtClean="0"/>
-              <a:t>computing</a:t>
+              <a:t>Scientific computing</a:t>
             </a:r>
           </a:p>
           <a:p>
             <a:pPr algn="l" rtl="0"/>
             <a:r>
               <a:rPr lang="en-US" dirty="0" smtClean="0"/>
-              <a:t>Enterprise </a:t>
-            </a:r>
-            <a:r>
-              <a:rPr lang="en-US" dirty="0" smtClean="0"/>
-              <a:t>software</a:t>
+              <a:t>Enterprise software</a:t>
             </a:r>
           </a:p>
           <a:p>
             <a:pPr algn="l" rtl="0"/>
             <a:r>
               <a:rPr lang="en-US" dirty="0" smtClean="0"/>
-              <a:t>Web </a:t>
-            </a:r>
-            <a:r>
-              <a:rPr lang="en-US" dirty="0" smtClean="0"/>
-              <a:t>design</a:t>
+              <a:t>Web design</a:t>
             </a:r>
           </a:p>
           <a:p>
@@ -4707,7 +4692,6 @@
               <a:rPr lang="en-US" dirty="0" smtClean="0"/>
               <a:t>Back-end</a:t>
             </a:r>
-            <a:endParaRPr lang="en-US" dirty="0" smtClean="0"/>
           </a:p>
           <a:p>
             <a:pPr algn="l" rtl="0"/>
@@ -4715,17 +4699,12 @@
               <a:rPr lang="en-US" dirty="0" smtClean="0"/>
               <a:t>Front-end</a:t>
             </a:r>
-            <a:endParaRPr lang="en-US" dirty="0" smtClean="0"/>
           </a:p>
           <a:p>
             <a:pPr algn="l" rtl="0"/>
             <a:r>
               <a:rPr lang="en-US" dirty="0" smtClean="0"/>
-              <a:t>Everything </a:t>
-            </a:r>
-            <a:r>
-              <a:rPr lang="en-US" dirty="0" smtClean="0"/>
-              <a:t>in between</a:t>
+              <a:t>Everything in between</a:t>
             </a:r>
           </a:p>
         </p:txBody>
@@ -5072,22 +5051,45 @@
             <a:pPr algn="l" rtl="0"/>
             <a:r>
               <a:rPr lang="en-US" sz="2000" dirty="0" smtClean="0"/>
-              <a:t>Python helped iterate fast through all the different error cases they experienced on the wide variety of platforms they support.</a:t>
-            </a:r>
+              <a:t>Python helped iterate fast through </a:t>
+            </a:r>
+            <a:r>
+              <a:rPr lang="en-US" sz="2000" dirty="0" smtClean="0"/>
+              <a:t>error </a:t>
+            </a:r>
+            <a:r>
+              <a:rPr lang="en-US" sz="2000" dirty="0" smtClean="0"/>
+              <a:t>cases they experienced on the wide variety of platforms they </a:t>
+            </a:r>
+            <a:r>
+              <a:rPr lang="en-US" sz="2000" dirty="0" smtClean="0"/>
+              <a:t>support.</a:t>
+            </a:r>
+            <a:endParaRPr lang="en-US" sz="2000" dirty="0" smtClean="0"/>
           </a:p>
           <a:p>
             <a:pPr algn="l" rtl="0"/>
             <a:r>
               <a:rPr lang="en-US" sz="2000" dirty="0" smtClean="0"/>
-              <a:t>Use C for inner loops - optimizing CPU is easy</a:t>
-            </a:r>
+              <a:t>Use C for inner loops - optimizing CPU is </a:t>
+            </a:r>
+            <a:r>
+              <a:rPr lang="en-US" sz="2000" dirty="0" smtClean="0"/>
+              <a:t>easy.</a:t>
+            </a:r>
+            <a:endParaRPr lang="en-US" sz="2000" dirty="0" smtClean="0"/>
           </a:p>
           <a:p>
             <a:pPr algn="l" rtl="0"/>
             <a:r>
               <a:rPr lang="en-US" sz="2000" dirty="0" smtClean="0"/>
-              <a:t>Custom memory allocator - optimizing memory is hard</a:t>
-            </a:r>
+              <a:t>Custom memory allocator - optimizing memory is </a:t>
+            </a:r>
+            <a:r>
+              <a:rPr lang="en-US" sz="2000" dirty="0" smtClean="0"/>
+              <a:t>harder.</a:t>
+            </a:r>
+            <a:endParaRPr lang="en-US" sz="2000" dirty="0" smtClean="0"/>
           </a:p>
           <a:p>
             <a:pPr marL="0" indent="0" algn="l" rtl="0">
@@ -5449,7 +5451,7 @@
               <a:buAutoNum type="arabicPeriod"/>
             </a:pPr>
             <a:r>
-              <a:rPr lang="en-US" dirty="0" smtClean="0"/>
+              <a:rPr lang="en-US" sz="3300" dirty="0" smtClean="0"/>
               <a:t>Python requires less supporting code – less boilerplate</a:t>
             </a:r>
           </a:p>
@@ -5459,7 +5461,7 @@
               <a:buAutoNum type="arabicPeriod"/>
             </a:pPr>
             <a:r>
-              <a:rPr lang="en-US" dirty="0" smtClean="0"/>
+              <a:rPr lang="en-US" sz="3300" dirty="0" smtClean="0"/>
               <a:t>Python speeds the development cycle – no compilation</a:t>
             </a:r>
           </a:p>
@@ -5469,7 +5471,7 @@
               <a:buAutoNum type="arabicPeriod"/>
             </a:pPr>
             <a:r>
-              <a:rPr lang="en-GB" dirty="0" smtClean="0"/>
+              <a:rPr lang="en-GB" sz="3300" dirty="0" smtClean="0"/>
               <a:t>Python facilitates debugging – even without using debugger</a:t>
             </a:r>
           </a:p>
@@ -5751,7 +5753,7 @@
         </p:spPr>
         <p:txBody>
           <a:bodyPr>
-            <a:normAutofit fontScale="77500" lnSpcReduction="20000"/>
+            <a:normAutofit fontScale="92500" lnSpcReduction="10000"/>
           </a:bodyPr>
           <a:lstStyle/>
           <a:p>
@@ -5799,24 +5801,44 @@
               <a:buNone/>
             </a:pPr>
             <a:r>
+              <a:rPr lang="en-US" b="1" i="1" dirty="0" smtClean="0"/>
+              <a:t>You </a:t>
+            </a:r>
+            <a:r>
+              <a:rPr lang="en-US" b="1" i="1" dirty="0"/>
+              <a:t>spend more time reading code than writing it</a:t>
+            </a:r>
+            <a:r>
               <a:rPr lang="en-US" i="1" dirty="0"/>
-              <a:t>A friend of mine who knows nearly all the widely used languages uses Python for most of his projects. He says the main reason is that </a:t>
-            </a:r>
-            <a:r>
-              <a:rPr lang="en-US" b="1" i="1" dirty="0"/>
-              <a:t>he likes the way source code looks</a:t>
+              <a:t>. </a:t>
+            </a:r>
+            <a:endParaRPr lang="en-US" i="1" dirty="0" smtClean="0"/>
+          </a:p>
+          <a:p>
+            <a:pPr marL="400050" lvl="1" indent="0" algn="l" rtl="0">
+              <a:buNone/>
+            </a:pPr>
+            <a:r>
+              <a:rPr lang="en-US" i="1" dirty="0" smtClean="0"/>
+              <a:t>You </a:t>
             </a:r>
             <a:r>
               <a:rPr lang="en-US" i="1" dirty="0"/>
-              <a:t>. That may seem a frivolous reason to choose one language over another. But it is not so frivolous as it sounds: when you program, </a:t>
-            </a:r>
-            <a:r>
-              <a:rPr lang="en-US" b="1" i="1" dirty="0"/>
-              <a:t>you spend more time reading code than writing it</a:t>
+              <a:t>push blobs of source code around the way a sculptor does blobs of clay. </a:t>
+            </a:r>
+            <a:endParaRPr lang="en-US" i="1" dirty="0" smtClean="0"/>
+          </a:p>
+          <a:p>
+            <a:pPr marL="400050" lvl="1" indent="0" algn="l" rtl="0">
+              <a:buNone/>
+            </a:pPr>
+            <a:r>
+              <a:rPr lang="en-US" i="1" dirty="0" smtClean="0"/>
+              <a:t>So </a:t>
             </a:r>
             <a:r>
               <a:rPr lang="en-US" i="1" dirty="0"/>
-              <a:t>. You push blobs of source code around the way a sculptor does blobs of clay. So a </a:t>
+              <a:t>a </a:t>
             </a:r>
             <a:r>
               <a:rPr lang="en-US" b="1" i="1" dirty="0"/>
@@ -5824,7 +5846,15 @@
             </a:r>
             <a:r>
               <a:rPr lang="en-US" i="1" dirty="0"/>
-              <a:t>, as clay full of lumps would be to a sculptor</a:t>
+              <a:t>, </a:t>
+            </a:r>
+            <a:r>
+              <a:rPr lang="en-US" i="1" dirty="0" smtClean="0"/>
+              <a:t>as </a:t>
+            </a:r>
+            <a:r>
+              <a:rPr lang="en-US" i="1" dirty="0"/>
+              <a:t>clay full of lumps would be to a sculptor</a:t>
             </a:r>
             <a:r>
               <a:rPr lang="en-US" i="1" dirty="0" smtClean="0"/>
@@ -5999,11 +6029,7 @@
             <a:pPr algn="l" rtl="0"/>
             <a:r>
               <a:rPr lang="en-US" dirty="0" smtClean="0"/>
-              <a:t>The implied usefulness is that these things each have their own members and methods that encapsulate its functionality and </a:t>
-            </a:r>
-            <a:r>
-              <a:rPr lang="en-US" dirty="0" smtClean="0"/>
-              <a:t>information</a:t>
+              <a:t>The implied usefulness is that these things each have their own members and methods that encapsulate its functionality and information</a:t>
             </a:r>
           </a:p>
           <a:p>
@@ -7321,6 +7347,345 @@
           <a:chExt cx="0" cy="0"/>
         </a:xfrm>
       </p:grpSpPr>
+      <p:pic>
+        <p:nvPicPr>
+          <p:cNvPr id="1026" name="Picture 2"/>
+          <p:cNvPicPr>
+            <a:picLocks noChangeAspect="1" noChangeArrowheads="1"/>
+          </p:cNvPicPr>
+          <p:nvPr/>
+        </p:nvPicPr>
+        <p:blipFill>
+          <a:blip r:embed="rId2">
+            <a:extLst>
+              <a:ext uri="{28A0092B-C50C-407E-A947-70E740481C1C}">
+                <a14:useLocalDpi xmlns:a14="http://schemas.microsoft.com/office/drawing/2010/main" val="0"/>
+              </a:ext>
+            </a:extLst>
+          </a:blip>
+          <a:srcRect/>
+          <a:stretch>
+            <a:fillRect/>
+          </a:stretch>
+        </p:blipFill>
+        <p:spPr bwMode="auto">
+          <a:xfrm>
+            <a:off x="6519325" y="16881"/>
+            <a:ext cx="2624675" cy="2372706"/>
+          </a:xfrm>
+          <a:prstGeom prst="rect">
+            <a:avLst/>
+          </a:prstGeom>
+          <a:noFill/>
+          <a:ln>
+            <a:noFill/>
+          </a:ln>
+          <a:extLst>
+            <a:ext uri="{909E8E84-426E-40DD-AFC4-6F175D3DCCD1}">
+              <a14:hiddenFill xmlns:a14="http://schemas.microsoft.com/office/drawing/2010/main">
+                <a:solidFill>
+                  <a:schemeClr val="accent1"/>
+                </a:solidFill>
+              </a14:hiddenFill>
+            </a:ext>
+            <a:ext uri="{91240B29-F687-4F45-9708-019B960494DF}">
+              <a14:hiddenLine xmlns:a14="http://schemas.microsoft.com/office/drawing/2010/main" w="9525">
+                <a:solidFill>
+                  <a:schemeClr val="tx1"/>
+                </a:solidFill>
+                <a:miter lim="800000"/>
+                <a:headEnd/>
+                <a:tailEnd/>
+              </a14:hiddenLine>
+            </a:ext>
+          </a:extLst>
+        </p:spPr>
+      </p:pic>
+      <p:sp>
+        <p:nvSpPr>
+          <p:cNvPr id="2" name="Title 1"/>
+          <p:cNvSpPr>
+            <a:spLocks noGrp="1"/>
+          </p:cNvSpPr>
+          <p:nvPr>
+            <p:ph type="title"/>
+          </p:nvPr>
+        </p:nvSpPr>
+        <p:spPr/>
+        <p:txBody>
+          <a:bodyPr/>
+          <a:lstStyle/>
+          <a:p>
+            <a:pPr algn="l" rtl="0"/>
+            <a:r>
+              <a:rPr lang="en-US" b="1" dirty="0" smtClean="0"/>
+              <a:t>First </a:t>
+            </a:r>
+            <a:r>
+              <a:rPr lang="en-US" b="1" dirty="0" err="1" smtClean="0"/>
+              <a:t>PyCon</a:t>
+            </a:r>
+            <a:r>
+              <a:rPr lang="en-US" b="1" dirty="0" smtClean="0"/>
+              <a:t> in Israel!</a:t>
+            </a:r>
+            <a:endParaRPr lang="he-IL" b="1" dirty="0"/>
+          </a:p>
+        </p:txBody>
+      </p:sp>
+      <p:sp>
+        <p:nvSpPr>
+          <p:cNvPr id="3" name="Content Placeholder 2"/>
+          <p:cNvSpPr>
+            <a:spLocks noGrp="1"/>
+          </p:cNvSpPr>
+          <p:nvPr>
+            <p:ph idx="1"/>
+          </p:nvPr>
+        </p:nvSpPr>
+        <p:spPr>
+          <a:xfrm>
+            <a:off x="457200" y="1600200"/>
+            <a:ext cx="8229600" cy="5133578"/>
+          </a:xfrm>
+        </p:spPr>
+        <p:txBody>
+          <a:bodyPr>
+            <a:normAutofit fontScale="77500" lnSpcReduction="20000"/>
+          </a:bodyPr>
+          <a:lstStyle/>
+          <a:p>
+            <a:pPr marL="0" indent="0" algn="l" rtl="0">
+              <a:buNone/>
+            </a:pPr>
+            <a:r>
+              <a:rPr lang="en-US" dirty="0" smtClean="0"/>
+              <a:t>Tel </a:t>
+            </a:r>
+            <a:r>
+              <a:rPr lang="en-US" dirty="0"/>
+              <a:t>Aviv, </a:t>
+            </a:r>
+            <a:r>
+              <a:rPr lang="en-US" dirty="0" smtClean="0"/>
+              <a:t>Israel, May 2-3</a:t>
+            </a:r>
+          </a:p>
+          <a:p>
+            <a:pPr marL="0" indent="0" algn="l" rtl="0">
+              <a:buNone/>
+            </a:pPr>
+            <a:endParaRPr lang="en-US" dirty="0" smtClean="0"/>
+          </a:p>
+          <a:p>
+            <a:pPr marL="0" indent="0" algn="l" rtl="0">
+              <a:buNone/>
+            </a:pPr>
+            <a:r>
+              <a:rPr lang="en-US" dirty="0" smtClean="0"/>
+              <a:t>Keynote by Travis Oliphant, creator of </a:t>
+            </a:r>
+            <a:r>
+              <a:rPr lang="en-US" dirty="0" err="1" smtClean="0"/>
+              <a:t>NumPy</a:t>
+            </a:r>
+            <a:r>
+              <a:rPr lang="en-US" dirty="0" smtClean="0"/>
+              <a:t> &amp; </a:t>
+            </a:r>
+            <a:r>
+              <a:rPr lang="en-US" dirty="0" err="1" smtClean="0"/>
+              <a:t>SciPy</a:t>
+            </a:r>
+            <a:r>
+              <a:rPr lang="en-US" dirty="0" smtClean="0"/>
+              <a:t>.</a:t>
+            </a:r>
+          </a:p>
+          <a:p>
+            <a:pPr marL="0" indent="0" algn="l" rtl="0">
+              <a:buNone/>
+            </a:pPr>
+            <a:endParaRPr lang="en-US" dirty="0" smtClean="0"/>
+          </a:p>
+          <a:p>
+            <a:pPr marL="0" indent="0" algn="l" rtl="0">
+              <a:buNone/>
+            </a:pPr>
+            <a:r>
+              <a:rPr lang="en-US" dirty="0" smtClean="0"/>
+              <a:t>Sponsored by </a:t>
+            </a:r>
+            <a:r>
+              <a:rPr lang="en-US" dirty="0" err="1" smtClean="0"/>
+              <a:t>RedHat</a:t>
+            </a:r>
+            <a:r>
+              <a:rPr lang="en-US" dirty="0" smtClean="0"/>
+              <a:t>, </a:t>
+            </a:r>
+            <a:r>
+              <a:rPr lang="en-US" dirty="0" err="1" smtClean="0"/>
+              <a:t>Cymmetria</a:t>
+            </a:r>
+            <a:r>
+              <a:rPr lang="en-US" dirty="0" smtClean="0"/>
+              <a:t>, </a:t>
+            </a:r>
+            <a:r>
+              <a:rPr lang="en-US" dirty="0" err="1" smtClean="0"/>
+              <a:t>AutoDesk</a:t>
+            </a:r>
+            <a:r>
+              <a:rPr lang="en-US" dirty="0" smtClean="0"/>
+              <a:t>, </a:t>
+            </a:r>
+            <a:r>
+              <a:rPr lang="en-US" dirty="0" err="1" smtClean="0"/>
+              <a:t>XtremIO</a:t>
+            </a:r>
+            <a:r>
+              <a:rPr lang="en-US" dirty="0" smtClean="0"/>
+              <a:t>, Cisco, Dropbox, </a:t>
+            </a:r>
+            <a:r>
+              <a:rPr lang="en-US" dirty="0" err="1" smtClean="0"/>
+              <a:t>SentinelOne</a:t>
+            </a:r>
+            <a:r>
+              <a:rPr lang="en-US" dirty="0" smtClean="0"/>
+              <a:t>, </a:t>
+            </a:r>
+            <a:r>
+              <a:rPr lang="en-US" dirty="0" err="1" smtClean="0"/>
+              <a:t>Cloudify</a:t>
+            </a:r>
+            <a:r>
+              <a:rPr lang="en-US" dirty="0" smtClean="0"/>
+              <a:t>, </a:t>
+            </a:r>
+            <a:r>
+              <a:rPr lang="en-US" dirty="0" err="1" smtClean="0"/>
+              <a:t>Adgorithms</a:t>
+            </a:r>
+            <a:r>
+              <a:rPr lang="en-US" dirty="0" smtClean="0"/>
+              <a:t>, PSF, </a:t>
+            </a:r>
+            <a:r>
+              <a:rPr lang="en-US" dirty="0" err="1" smtClean="0"/>
+              <a:t>applitools</a:t>
+            </a:r>
+            <a:r>
+              <a:rPr lang="en-US" dirty="0" smtClean="0"/>
+              <a:t>, HP</a:t>
+            </a:r>
+            <a:endParaRPr lang="en-US" dirty="0"/>
+          </a:p>
+          <a:p>
+            <a:pPr marL="0" indent="0" algn="l" rtl="0">
+              <a:buNone/>
+            </a:pPr>
+            <a:endParaRPr lang="en-US" dirty="0" smtClean="0"/>
+          </a:p>
+          <a:p>
+            <a:pPr marL="0" indent="0" algn="l" rtl="0">
+              <a:buNone/>
+            </a:pPr>
+            <a:r>
+              <a:rPr lang="en-US" dirty="0" smtClean="0"/>
+              <a:t>I’m giving a talk: </a:t>
+            </a:r>
+          </a:p>
+          <a:p>
+            <a:pPr marL="0" indent="0" algn="l" rtl="0">
+              <a:buNone/>
+            </a:pPr>
+            <a:r>
+              <a:rPr lang="en-US" b="1" dirty="0"/>
+              <a:t>How to Study Evolution Using Scientific Python</a:t>
+            </a:r>
+          </a:p>
+          <a:p>
+            <a:pPr marL="0" indent="0" algn="l" rtl="0">
+              <a:buNone/>
+            </a:pPr>
+            <a:endParaRPr lang="en-US" dirty="0"/>
+          </a:p>
+          <a:p>
+            <a:pPr marL="0" indent="0" algn="l" rtl="0">
+              <a:buNone/>
+            </a:pPr>
+            <a:r>
+              <a:rPr lang="en-GB" dirty="0" smtClean="0">
+                <a:hlinkClick r:id="rId3"/>
+              </a:rPr>
+              <a:t>http://il.pycon.org</a:t>
+            </a:r>
+            <a:endParaRPr lang="en-GB" dirty="0" smtClean="0"/>
+          </a:p>
+          <a:p>
+            <a:pPr marL="0" indent="0" algn="l" rtl="0">
+              <a:buNone/>
+            </a:pPr>
+            <a:r>
+              <a:rPr lang="en-GB" dirty="0">
+                <a:hlinkClick r:id="rId4"/>
+              </a:rPr>
+              <a:t>pycon-israel@googlegroups.com</a:t>
+            </a:r>
+            <a:endParaRPr lang="en-GB" dirty="0" smtClean="0"/>
+          </a:p>
+          <a:p>
+            <a:pPr marL="0" indent="0" algn="l" rtl="0">
+              <a:buNone/>
+            </a:pPr>
+            <a:endParaRPr lang="en-GB" dirty="0"/>
+          </a:p>
+          <a:p>
+            <a:pPr marL="0" indent="0" algn="l" rtl="0">
+              <a:buNone/>
+            </a:pPr>
+            <a:endParaRPr lang="en-GB" dirty="0" smtClean="0"/>
+          </a:p>
+          <a:p>
+            <a:pPr marL="0" indent="0" algn="l" rtl="0">
+              <a:buNone/>
+            </a:pPr>
+            <a:endParaRPr lang="he-IL" dirty="0"/>
+          </a:p>
+        </p:txBody>
+      </p:sp>
+    </p:spTree>
+    <p:extLst>
+      <p:ext uri="{BB962C8B-B14F-4D97-AF65-F5344CB8AC3E}">
+        <p14:creationId xmlns:p14="http://schemas.microsoft.com/office/powerpoint/2010/main" val="3636087581"/>
+      </p:ext>
+    </p:extLst>
+  </p:cSld>
+  <p:clrMapOvr>
+    <a:masterClrMapping/>
+  </p:clrMapOvr>
+</p:sld>
+</file>
+
+<file path=ppt/slides/slide35.xml><?xml version="1.0" encoding="utf-8"?>
+<p:sld xmlns:a="http://schemas.openxmlformats.org/drawingml/2006/main" xmlns:r="http://schemas.openxmlformats.org/officeDocument/2006/relationships" xmlns:p="http://schemas.openxmlformats.org/presentationml/2006/main">
+  <p:cSld>
+    <p:spTree>
+      <p:nvGrpSpPr>
+        <p:cNvPr id="1" name=""/>
+        <p:cNvGrpSpPr/>
+        <p:nvPr/>
+      </p:nvGrpSpPr>
+      <p:grpSpPr>
+        <a:xfrm>
+          <a:off x="0" y="0"/>
+          <a:ext cx="0" cy="0"/>
+          <a:chOff x="0" y="0"/>
+          <a:chExt cx="0" cy="0"/>
+        </a:xfrm>
+      </p:grpSpPr>
       <p:sp>
         <p:nvSpPr>
           <p:cNvPr id="2" name="Title 1"/>
@@ -7358,7 +7723,7 @@
 </p:sld>
 </file>
 
-<file path=ppt/slides/slide35.xml><?xml version="1.0" encoding="utf-8"?>
+<file path=ppt/slides/slide36.xml><?xml version="1.0" encoding="utf-8"?>
 <p:sld xmlns:a="http://schemas.openxmlformats.org/drawingml/2006/main" xmlns:r="http://schemas.openxmlformats.org/officeDocument/2006/relationships" xmlns:p="http://schemas.openxmlformats.org/presentationml/2006/main">
   <p:cSld>
     <p:spTree>
@@ -7455,15 +7820,7 @@
             <a:pPr algn="l" rtl="0"/>
             <a:r>
               <a:rPr lang="en-US" sz="2400" dirty="0" smtClean="0"/>
-              <a:t>During 2015, </a:t>
-            </a:r>
-            <a:r>
-              <a:rPr lang="en-US" sz="2400" dirty="0" smtClean="0"/>
-              <a:t>&gt; 1,500 </a:t>
-            </a:r>
-            <a:r>
-              <a:rPr lang="en-US" sz="2400" dirty="0" smtClean="0"/>
-              <a:t>new packages released </a:t>
+              <a:t>During 2015, &gt; 1,500 new packages released </a:t>
             </a:r>
             <a:r>
               <a:rPr lang="en-US" sz="2400" u="sng" dirty="0" smtClean="0"/>
@@ -7471,11 +7828,7 @@
             </a:r>
             <a:r>
               <a:rPr lang="en-US" sz="2400" dirty="0" smtClean="0"/>
-              <a:t> </a:t>
-            </a:r>
-            <a:r>
-              <a:rPr lang="en-US" sz="2400" dirty="0" smtClean="0"/>
-              <a:t>to </a:t>
+              <a:t> to </a:t>
             </a:r>
             <a:r>
               <a:rPr lang="en-US" sz="2400" dirty="0" err="1" smtClean="0">
@@ -7487,7 +7840,6 @@
               <a:rPr lang="en-US" sz="2400" dirty="0" smtClean="0"/>
               <a:t>. </a:t>
             </a:r>
-            <a:endParaRPr lang="en-US" sz="2400" dirty="0" smtClean="0"/>
           </a:p>
           <a:p>
             <a:pPr algn="l" rtl="0"/>
@@ -7519,126 +7871,6 @@
     <p:extLst>
       <p:ext uri="{BB962C8B-B14F-4D97-AF65-F5344CB8AC3E}">
         <p14:creationId xmlns:p14="http://schemas.microsoft.com/office/powerpoint/2010/main" val="3644176354"/>
-      </p:ext>
-    </p:extLst>
-  </p:cSld>
-  <p:clrMapOvr>
-    <a:masterClrMapping/>
-  </p:clrMapOvr>
-</p:sld>
-</file>
-
-<file path=ppt/slides/slide36.xml><?xml version="1.0" encoding="utf-8"?>
-<p:sld xmlns:a="http://schemas.openxmlformats.org/drawingml/2006/main" xmlns:r="http://schemas.openxmlformats.org/officeDocument/2006/relationships" xmlns:p="http://schemas.openxmlformats.org/presentationml/2006/main">
-  <p:cSld>
-    <p:spTree>
-      <p:nvGrpSpPr>
-        <p:cNvPr id="1" name=""/>
-        <p:cNvGrpSpPr/>
-        <p:nvPr/>
-      </p:nvGrpSpPr>
-      <p:grpSpPr>
-        <a:xfrm>
-          <a:off x="0" y="0"/>
-          <a:ext cx="0" cy="0"/>
-          <a:chOff x="0" y="0"/>
-          <a:chExt cx="0" cy="0"/>
-        </a:xfrm>
-      </p:grpSpPr>
-      <p:sp>
-        <p:nvSpPr>
-          <p:cNvPr id="4" name="Title 3"/>
-          <p:cNvSpPr>
-            <a:spLocks noGrp="1"/>
-          </p:cNvSpPr>
-          <p:nvPr>
-            <p:ph type="ctrTitle"/>
-          </p:nvPr>
-        </p:nvSpPr>
-        <p:spPr/>
-        <p:txBody>
-          <a:bodyPr>
-            <a:normAutofit/>
-          </a:bodyPr>
-          <a:lstStyle/>
-          <a:p>
-            <a:pPr rtl="0"/>
-            <a:r>
-              <a:rPr lang="en-US" dirty="0" smtClean="0"/>
-              <a:t>Python can do nearly everything MATLAB can do</a:t>
-            </a:r>
-            <a:endParaRPr lang="he-IL" dirty="0"/>
-          </a:p>
-        </p:txBody>
-      </p:sp>
-      <p:sp>
-        <p:nvSpPr>
-          <p:cNvPr id="5" name="Subtitle 4"/>
-          <p:cNvSpPr>
-            <a:spLocks noGrp="1"/>
-          </p:cNvSpPr>
-          <p:nvPr>
-            <p:ph type="subTitle" idx="1"/>
-          </p:nvPr>
-        </p:nvSpPr>
-        <p:spPr/>
-        <p:txBody>
-          <a:bodyPr/>
-          <a:lstStyle/>
-          <a:p>
-            <a:pPr rtl="0"/>
-            <a:r>
-              <a:rPr lang="en-US" dirty="0" smtClean="0"/>
-              <a:t>With libraries like </a:t>
-            </a:r>
-            <a:r>
-              <a:rPr lang="en-US" dirty="0" err="1" smtClean="0"/>
-              <a:t>NumPy</a:t>
-            </a:r>
-            <a:r>
-              <a:rPr lang="en-US" dirty="0" smtClean="0"/>
-              <a:t>, </a:t>
-            </a:r>
-            <a:r>
-              <a:rPr lang="en-US" dirty="0" err="1" smtClean="0"/>
-              <a:t>SciPy</a:t>
-            </a:r>
-            <a:r>
-              <a:rPr lang="en-US" dirty="0" smtClean="0"/>
-              <a:t>, </a:t>
-            </a:r>
-            <a:r>
-              <a:rPr lang="en-US" dirty="0" err="1" smtClean="0"/>
-              <a:t>Matplotlib</a:t>
-            </a:r>
-            <a:r>
-              <a:rPr lang="en-US" dirty="0" smtClean="0"/>
-              <a:t>, </a:t>
-            </a:r>
-            <a:r>
-              <a:rPr lang="en-US" dirty="0" err="1" smtClean="0"/>
-              <a:t>IPython</a:t>
-            </a:r>
-            <a:r>
-              <a:rPr lang="en-US" dirty="0" smtClean="0"/>
-              <a:t>, </a:t>
-            </a:r>
-            <a:r>
-              <a:rPr lang="en-US" dirty="0" err="1" smtClean="0"/>
-              <a:t>Scikit</a:t>
-            </a:r>
-            <a:r>
-              <a:rPr lang="en-US" dirty="0" smtClean="0"/>
-              <a:t>, and more</a:t>
-            </a:r>
-            <a:endParaRPr lang="he-IL" dirty="0"/>
-          </a:p>
-        </p:txBody>
-      </p:sp>
-    </p:spTree>
-    <p:extLst>
-      <p:ext uri="{BB962C8B-B14F-4D97-AF65-F5344CB8AC3E}">
-        <p14:creationId xmlns:p14="http://schemas.microsoft.com/office/powerpoint/2010/main" val="1802572147"/>
       </p:ext>
     </p:extLst>
   </p:cSld>
@@ -7667,6 +7899,126 @@
       </p:grpSpPr>
       <p:sp>
         <p:nvSpPr>
+          <p:cNvPr id="4" name="Title 3"/>
+          <p:cNvSpPr>
+            <a:spLocks noGrp="1"/>
+          </p:cNvSpPr>
+          <p:nvPr>
+            <p:ph type="ctrTitle"/>
+          </p:nvPr>
+        </p:nvSpPr>
+        <p:spPr/>
+        <p:txBody>
+          <a:bodyPr>
+            <a:normAutofit/>
+          </a:bodyPr>
+          <a:lstStyle/>
+          <a:p>
+            <a:pPr rtl="0"/>
+            <a:r>
+              <a:rPr lang="en-US" dirty="0" smtClean="0"/>
+              <a:t>Python can do nearly everything MATLAB can do</a:t>
+            </a:r>
+            <a:endParaRPr lang="he-IL" dirty="0"/>
+          </a:p>
+        </p:txBody>
+      </p:sp>
+      <p:sp>
+        <p:nvSpPr>
+          <p:cNvPr id="5" name="Subtitle 4"/>
+          <p:cNvSpPr>
+            <a:spLocks noGrp="1"/>
+          </p:cNvSpPr>
+          <p:nvPr>
+            <p:ph type="subTitle" idx="1"/>
+          </p:nvPr>
+        </p:nvSpPr>
+        <p:spPr/>
+        <p:txBody>
+          <a:bodyPr/>
+          <a:lstStyle/>
+          <a:p>
+            <a:pPr rtl="0"/>
+            <a:r>
+              <a:rPr lang="en-US" dirty="0" smtClean="0"/>
+              <a:t>With libraries like </a:t>
+            </a:r>
+            <a:r>
+              <a:rPr lang="en-US" dirty="0" err="1" smtClean="0"/>
+              <a:t>NumPy</a:t>
+            </a:r>
+            <a:r>
+              <a:rPr lang="en-US" dirty="0" smtClean="0"/>
+              <a:t>, </a:t>
+            </a:r>
+            <a:r>
+              <a:rPr lang="en-US" dirty="0" err="1" smtClean="0"/>
+              <a:t>SciPy</a:t>
+            </a:r>
+            <a:r>
+              <a:rPr lang="en-US" dirty="0" smtClean="0"/>
+              <a:t>, </a:t>
+            </a:r>
+            <a:r>
+              <a:rPr lang="en-US" dirty="0" err="1" smtClean="0"/>
+              <a:t>Matplotlib</a:t>
+            </a:r>
+            <a:r>
+              <a:rPr lang="en-US" dirty="0" smtClean="0"/>
+              <a:t>, </a:t>
+            </a:r>
+            <a:r>
+              <a:rPr lang="en-US" dirty="0" err="1" smtClean="0"/>
+              <a:t>IPython</a:t>
+            </a:r>
+            <a:r>
+              <a:rPr lang="en-US" dirty="0" smtClean="0"/>
+              <a:t>, </a:t>
+            </a:r>
+            <a:r>
+              <a:rPr lang="en-US" dirty="0" err="1" smtClean="0"/>
+              <a:t>Scikit</a:t>
+            </a:r>
+            <a:r>
+              <a:rPr lang="en-US" dirty="0" smtClean="0"/>
+              <a:t>, and more</a:t>
+            </a:r>
+            <a:endParaRPr lang="he-IL" dirty="0"/>
+          </a:p>
+        </p:txBody>
+      </p:sp>
+    </p:spTree>
+    <p:extLst>
+      <p:ext uri="{BB962C8B-B14F-4D97-AF65-F5344CB8AC3E}">
+        <p14:creationId xmlns:p14="http://schemas.microsoft.com/office/powerpoint/2010/main" val="1802572147"/>
+      </p:ext>
+    </p:extLst>
+  </p:cSld>
+  <p:clrMapOvr>
+    <a:masterClrMapping/>
+  </p:clrMapOvr>
+</p:sld>
+</file>
+
+<file path=ppt/slides/slide38.xml><?xml version="1.0" encoding="utf-8"?>
+<p:sld xmlns:a="http://schemas.openxmlformats.org/drawingml/2006/main" xmlns:r="http://schemas.openxmlformats.org/officeDocument/2006/relationships" xmlns:p="http://schemas.openxmlformats.org/presentationml/2006/main">
+  <p:cSld>
+    <p:spTree>
+      <p:nvGrpSpPr>
+        <p:cNvPr id="1" name=""/>
+        <p:cNvGrpSpPr/>
+        <p:nvPr/>
+      </p:nvGrpSpPr>
+      <p:grpSpPr>
+        <a:xfrm>
+          <a:off x="0" y="0"/>
+          <a:ext cx="0" cy="0"/>
+          <a:chOff x="0" y="0"/>
+          <a:chExt cx="0" cy="0"/>
+        </a:xfrm>
+      </p:grpSpPr>
+      <p:sp>
+        <p:nvSpPr>
           <p:cNvPr id="2" name="Title 1"/>
           <p:cNvSpPr>
             <a:spLocks noGrp="1"/>
@@ -7702,7 +8054,7 @@
 </p:sld>
 </file>
 
-<file path=ppt/slides/slide38.xml><?xml version="1.0" encoding="utf-8"?>
+<file path=ppt/slides/slide39.xml><?xml version="1.0" encoding="utf-8"?>
 <p:sld xmlns:a="http://schemas.openxmlformats.org/drawingml/2006/main" xmlns:r="http://schemas.openxmlformats.org/officeDocument/2006/relationships" xmlns:p="http://schemas.openxmlformats.org/presentationml/2006/main">
   <p:cSld>
     <p:spTree>
@@ -7818,7 +8170,402 @@
 </p:sld>
 </file>
 
-<file path=ppt/slides/slide39.xml><?xml version="1.0" encoding="utf-8"?>
+<file path=ppt/slides/slide4.xml><?xml version="1.0" encoding="utf-8"?>
+<p:sld xmlns:a="http://schemas.openxmlformats.org/drawingml/2006/main" xmlns:r="http://schemas.openxmlformats.org/officeDocument/2006/relationships" xmlns:p="http://schemas.openxmlformats.org/presentationml/2006/main">
+  <p:cSld>
+    <p:spTree>
+      <p:nvGrpSpPr>
+        <p:cNvPr id="1" name=""/>
+        <p:cNvGrpSpPr/>
+        <p:nvPr/>
+      </p:nvGrpSpPr>
+      <p:grpSpPr>
+        <a:xfrm>
+          <a:off x="0" y="0"/>
+          <a:ext cx="0" cy="0"/>
+          <a:chOff x="0" y="0"/>
+          <a:chExt cx="0" cy="0"/>
+        </a:xfrm>
+      </p:grpSpPr>
+      <p:sp>
+        <p:nvSpPr>
+          <p:cNvPr id="4" name="Title 3"/>
+          <p:cNvSpPr>
+            <a:spLocks noGrp="1"/>
+          </p:cNvSpPr>
+          <p:nvPr>
+            <p:ph type="title"/>
+          </p:nvPr>
+        </p:nvSpPr>
+        <p:spPr/>
+        <p:txBody>
+          <a:bodyPr/>
+          <a:lstStyle/>
+          <a:p>
+            <a:pPr rtl="0"/>
+            <a:r>
+              <a:rPr lang="en-US" dirty="0" smtClean="0"/>
+              <a:t>Example</a:t>
+            </a:r>
+            <a:endParaRPr lang="he-IL" dirty="0"/>
+          </a:p>
+        </p:txBody>
+      </p:sp>
+      <p:sp>
+        <p:nvSpPr>
+          <p:cNvPr id="5" name="Text Placeholder 4"/>
+          <p:cNvSpPr>
+            <a:spLocks noGrp="1"/>
+          </p:cNvSpPr>
+          <p:nvPr>
+            <p:ph type="body" idx="1"/>
+          </p:nvPr>
+        </p:nvSpPr>
+        <p:spPr/>
+        <p:txBody>
+          <a:bodyPr/>
+          <a:lstStyle/>
+          <a:p>
+            <a:pPr algn="l" rtl="0"/>
+            <a:r>
+              <a:rPr lang="en-US" dirty="0" smtClean="0"/>
+              <a:t>C</a:t>
+            </a:r>
+            <a:endParaRPr lang="he-IL" dirty="0"/>
+          </a:p>
+        </p:txBody>
+      </p:sp>
+      <p:sp>
+        <p:nvSpPr>
+          <p:cNvPr id="6" name="Content Placeholder 5"/>
+          <p:cNvSpPr>
+            <a:spLocks noGrp="1"/>
+          </p:cNvSpPr>
+          <p:nvPr>
+            <p:ph sz="half" idx="2"/>
+          </p:nvPr>
+        </p:nvSpPr>
+        <p:spPr/>
+        <p:txBody>
+          <a:bodyPr>
+            <a:normAutofit fontScale="92500" lnSpcReduction="10000"/>
+          </a:bodyPr>
+          <a:lstStyle/>
+          <a:p>
+            <a:pPr marL="0" indent="0" algn="l" rtl="0">
+              <a:buNone/>
+            </a:pPr>
+            <a:r>
+              <a:rPr lang="en-GB" dirty="0"/>
+              <a:t>void </a:t>
+            </a:r>
+            <a:r>
+              <a:rPr lang="en-GB" dirty="0" smtClean="0"/>
+              <a:t>foo(</a:t>
+            </a:r>
+            <a:r>
+              <a:rPr lang="en-GB" dirty="0" err="1" smtClean="0"/>
+              <a:t>int</a:t>
+            </a:r>
+            <a:r>
+              <a:rPr lang="en-GB" dirty="0" smtClean="0"/>
+              <a:t> </a:t>
+            </a:r>
+            <a:r>
+              <a:rPr lang="en-GB" dirty="0"/>
+              <a:t>x) </a:t>
+            </a:r>
+            <a:endParaRPr lang="en-GB" dirty="0" smtClean="0"/>
+          </a:p>
+          <a:p>
+            <a:pPr marL="0" indent="0" algn="l" rtl="0">
+              <a:buNone/>
+            </a:pPr>
+            <a:r>
+              <a:rPr lang="en-GB" dirty="0" smtClean="0"/>
+              <a:t>{ </a:t>
+            </a:r>
+          </a:p>
+          <a:p>
+            <a:pPr marL="0" indent="0" algn="l" rtl="0">
+              <a:buNone/>
+            </a:pPr>
+            <a:r>
+              <a:rPr lang="en-GB" dirty="0" smtClean="0"/>
+              <a:t>    if (-1 &lt; x &amp;&amp; x &lt; 1) </a:t>
+            </a:r>
+            <a:r>
+              <a:rPr lang="en-GB" dirty="0"/>
+              <a:t>{ </a:t>
+            </a:r>
+            <a:endParaRPr lang="en-GB" dirty="0" smtClean="0"/>
+          </a:p>
+          <a:p>
+            <a:pPr marL="0" indent="0" algn="l" rtl="0">
+              <a:buNone/>
+            </a:pPr>
+            <a:r>
+              <a:rPr lang="en-GB" dirty="0"/>
+              <a:t> </a:t>
+            </a:r>
+            <a:r>
+              <a:rPr lang="en-GB" dirty="0" smtClean="0"/>
+              <a:t>         bar</a:t>
+            </a:r>
+            <a:r>
+              <a:rPr lang="en-GB" dirty="0"/>
+              <a:t>(); </a:t>
+            </a:r>
+            <a:endParaRPr lang="en-GB" dirty="0" smtClean="0"/>
+          </a:p>
+          <a:p>
+            <a:pPr marL="0" indent="0" algn="l" rtl="0">
+              <a:buNone/>
+            </a:pPr>
+            <a:r>
+              <a:rPr lang="en-GB" dirty="0"/>
+              <a:t> </a:t>
+            </a:r>
+            <a:r>
+              <a:rPr lang="en-GB" dirty="0" smtClean="0"/>
+              <a:t>         </a:t>
+            </a:r>
+            <a:r>
+              <a:rPr lang="en-GB" dirty="0" err="1" smtClean="0"/>
+              <a:t>baz</a:t>
+            </a:r>
+            <a:r>
+              <a:rPr lang="en-GB" dirty="0"/>
+              <a:t>(); </a:t>
+            </a:r>
+            <a:endParaRPr lang="en-GB" dirty="0" smtClean="0"/>
+          </a:p>
+          <a:p>
+            <a:pPr marL="0" indent="0" algn="l" rtl="0">
+              <a:buNone/>
+            </a:pPr>
+            <a:r>
+              <a:rPr lang="en-GB" dirty="0" smtClean="0"/>
+              <a:t>     } </a:t>
+            </a:r>
+            <a:r>
+              <a:rPr lang="en-GB" dirty="0"/>
+              <a:t>else { </a:t>
+            </a:r>
+            <a:endParaRPr lang="en-GB" dirty="0" smtClean="0"/>
+          </a:p>
+          <a:p>
+            <a:pPr marL="0" indent="0" algn="l" rtl="0">
+              <a:buNone/>
+            </a:pPr>
+            <a:r>
+              <a:rPr lang="en-GB" dirty="0"/>
+              <a:t> </a:t>
+            </a:r>
+            <a:r>
+              <a:rPr lang="en-GB" dirty="0" smtClean="0"/>
+              <a:t>         </a:t>
+            </a:r>
+            <a:r>
+              <a:rPr lang="en-GB" dirty="0" err="1" smtClean="0"/>
+              <a:t>qux</a:t>
+            </a:r>
+            <a:r>
+              <a:rPr lang="en-GB" dirty="0" smtClean="0"/>
+              <a:t>(x</a:t>
+            </a:r>
+            <a:r>
+              <a:rPr lang="en-GB" dirty="0"/>
+              <a:t>); </a:t>
+            </a:r>
+            <a:endParaRPr lang="en-GB" dirty="0" smtClean="0"/>
+          </a:p>
+          <a:p>
+            <a:pPr marL="0" indent="0" algn="l" rtl="0">
+              <a:buNone/>
+            </a:pPr>
+            <a:r>
+              <a:rPr lang="en-GB" dirty="0"/>
+              <a:t> </a:t>
+            </a:r>
+            <a:r>
+              <a:rPr lang="en-GB" dirty="0" smtClean="0"/>
+              <a:t>         foo(x </a:t>
+            </a:r>
+            <a:r>
+              <a:rPr lang="en-GB" dirty="0"/>
+              <a:t>- 1); </a:t>
+            </a:r>
+            <a:endParaRPr lang="en-GB" dirty="0" smtClean="0"/>
+          </a:p>
+          <a:p>
+            <a:pPr marL="0" indent="0" algn="l" rtl="0">
+              <a:buNone/>
+            </a:pPr>
+            <a:r>
+              <a:rPr lang="en-GB" dirty="0"/>
+              <a:t> </a:t>
+            </a:r>
+            <a:r>
+              <a:rPr lang="en-GB" dirty="0" smtClean="0"/>
+              <a:t>    } </a:t>
+            </a:r>
+          </a:p>
+          <a:p>
+            <a:pPr marL="0" indent="0" algn="l" rtl="0">
+              <a:buNone/>
+            </a:pPr>
+            <a:r>
+              <a:rPr lang="en-GB" dirty="0" smtClean="0"/>
+              <a:t>}</a:t>
+            </a:r>
+            <a:endParaRPr lang="he-IL" dirty="0"/>
+          </a:p>
+        </p:txBody>
+      </p:sp>
+      <p:sp>
+        <p:nvSpPr>
+          <p:cNvPr id="7" name="Text Placeholder 6"/>
+          <p:cNvSpPr>
+            <a:spLocks noGrp="1"/>
+          </p:cNvSpPr>
+          <p:nvPr>
+            <p:ph type="body" sz="quarter" idx="3"/>
+          </p:nvPr>
+        </p:nvSpPr>
+        <p:spPr/>
+        <p:txBody>
+          <a:bodyPr/>
+          <a:lstStyle/>
+          <a:p>
+            <a:pPr algn="l" rtl="0"/>
+            <a:r>
+              <a:rPr lang="en-US" dirty="0" smtClean="0"/>
+              <a:t>Python</a:t>
+            </a:r>
+            <a:endParaRPr lang="he-IL" dirty="0"/>
+          </a:p>
+        </p:txBody>
+      </p:sp>
+      <p:sp>
+        <p:nvSpPr>
+          <p:cNvPr id="8" name="Content Placeholder 7"/>
+          <p:cNvSpPr>
+            <a:spLocks noGrp="1"/>
+          </p:cNvSpPr>
+          <p:nvPr>
+            <p:ph sz="quarter" idx="4"/>
+          </p:nvPr>
+        </p:nvSpPr>
+        <p:spPr/>
+        <p:txBody>
+          <a:bodyPr/>
+          <a:lstStyle/>
+          <a:p>
+            <a:pPr marL="0" indent="0" algn="l" rtl="0">
+              <a:buNone/>
+            </a:pPr>
+            <a:r>
+              <a:rPr lang="en-US" dirty="0" err="1"/>
+              <a:t>def</a:t>
+            </a:r>
+            <a:r>
+              <a:rPr lang="en-US" dirty="0"/>
+              <a:t> foo(x):</a:t>
+            </a:r>
+          </a:p>
+          <a:p>
+            <a:pPr marL="0" indent="0" algn="l" rtl="0">
+              <a:buNone/>
+            </a:pPr>
+            <a:r>
+              <a:rPr lang="en-US" dirty="0"/>
+              <a:t>    if </a:t>
+            </a:r>
+            <a:r>
+              <a:rPr lang="en-US" dirty="0" smtClean="0"/>
+              <a:t>-1 &lt; x &lt; 1:</a:t>
+            </a:r>
+            <a:endParaRPr lang="en-US" dirty="0"/>
+          </a:p>
+          <a:p>
+            <a:pPr marL="0" indent="0" algn="l" rtl="0">
+              <a:buNone/>
+            </a:pPr>
+            <a:r>
+              <a:rPr lang="en-US" dirty="0"/>
+              <a:t>        bar()</a:t>
+            </a:r>
+          </a:p>
+          <a:p>
+            <a:pPr marL="0" indent="0" algn="l" rtl="0">
+              <a:buNone/>
+            </a:pPr>
+            <a:r>
+              <a:rPr lang="en-US" dirty="0"/>
+              <a:t>        </a:t>
+            </a:r>
+            <a:r>
+              <a:rPr lang="en-US" dirty="0" err="1"/>
+              <a:t>baz</a:t>
+            </a:r>
+            <a:r>
+              <a:rPr lang="en-US" dirty="0"/>
+              <a:t>()</a:t>
+            </a:r>
+          </a:p>
+          <a:p>
+            <a:pPr marL="0" indent="0" algn="l" rtl="0">
+              <a:buNone/>
+            </a:pPr>
+            <a:r>
+              <a:rPr lang="en-US" dirty="0"/>
+              <a:t>    else:</a:t>
+            </a:r>
+          </a:p>
+          <a:p>
+            <a:pPr marL="0" indent="0" algn="l" rtl="0">
+              <a:buNone/>
+            </a:pPr>
+            <a:r>
+              <a:rPr lang="en-US" dirty="0"/>
+              <a:t>        </a:t>
+            </a:r>
+            <a:r>
+              <a:rPr lang="en-US" dirty="0" err="1"/>
+              <a:t>qux</a:t>
+            </a:r>
+            <a:r>
+              <a:rPr lang="en-US" dirty="0"/>
+              <a:t>(x)</a:t>
+            </a:r>
+          </a:p>
+          <a:p>
+            <a:pPr marL="0" indent="0" algn="l" rtl="0">
+              <a:buNone/>
+            </a:pPr>
+            <a:r>
+              <a:rPr lang="en-US" dirty="0"/>
+              <a:t>        foo(x - 1)</a:t>
+            </a:r>
+            <a:endParaRPr lang="he-IL" dirty="0"/>
+          </a:p>
+        </p:txBody>
+      </p:sp>
+    </p:spTree>
+    <p:extLst>
+      <p:ext uri="{BB962C8B-B14F-4D97-AF65-F5344CB8AC3E}">
+        <p14:creationId xmlns:p14="http://schemas.microsoft.com/office/powerpoint/2010/main" val="2846433581"/>
+      </p:ext>
+    </p:extLst>
+  </p:cSld>
+  <p:clrMapOvr>
+    <a:masterClrMapping/>
+  </p:clrMapOvr>
+</p:sld>
+</file>
+
+<file path=ppt/slides/slide40.xml><?xml version="1.0" encoding="utf-8"?>
 <p:sld xmlns:a="http://schemas.openxmlformats.org/drawingml/2006/main" xmlns:r="http://schemas.openxmlformats.org/officeDocument/2006/relationships" xmlns:p="http://schemas.openxmlformats.org/presentationml/2006/main">
   <p:cSld>
     <p:spTree>
@@ -7973,7 +8720,7 @@
 </p:sld>
 </file>
 
-<file path=ppt/slides/slide4.xml><?xml version="1.0" encoding="utf-8"?>
+<file path=ppt/slides/slide41.xml><?xml version="1.0" encoding="utf-8"?>
 <p:sld xmlns:a="http://schemas.openxmlformats.org/drawingml/2006/main" xmlns:r="http://schemas.openxmlformats.org/officeDocument/2006/relationships" xmlns:p="http://schemas.openxmlformats.org/presentationml/2006/main">
   <p:cSld>
     <p:spTree>
@@ -7992,401 +8739,6 @@
       </p:grpSpPr>
       <p:sp>
         <p:nvSpPr>
-          <p:cNvPr id="4" name="Title 3"/>
-          <p:cNvSpPr>
-            <a:spLocks noGrp="1"/>
-          </p:cNvSpPr>
-          <p:nvPr>
-            <p:ph type="title"/>
-          </p:nvPr>
-        </p:nvSpPr>
-        <p:spPr/>
-        <p:txBody>
-          <a:bodyPr/>
-          <a:lstStyle/>
-          <a:p>
-            <a:pPr rtl="0"/>
-            <a:r>
-              <a:rPr lang="en-US" dirty="0" smtClean="0"/>
-              <a:t>Example</a:t>
-            </a:r>
-            <a:endParaRPr lang="he-IL" dirty="0"/>
-          </a:p>
-        </p:txBody>
-      </p:sp>
-      <p:sp>
-        <p:nvSpPr>
-          <p:cNvPr id="5" name="Text Placeholder 4"/>
-          <p:cNvSpPr>
-            <a:spLocks noGrp="1"/>
-          </p:cNvSpPr>
-          <p:nvPr>
-            <p:ph type="body" idx="1"/>
-          </p:nvPr>
-        </p:nvSpPr>
-        <p:spPr/>
-        <p:txBody>
-          <a:bodyPr/>
-          <a:lstStyle/>
-          <a:p>
-            <a:pPr algn="l" rtl="0"/>
-            <a:r>
-              <a:rPr lang="en-US" dirty="0" smtClean="0"/>
-              <a:t>C</a:t>
-            </a:r>
-            <a:endParaRPr lang="he-IL" dirty="0"/>
-          </a:p>
-        </p:txBody>
-      </p:sp>
-      <p:sp>
-        <p:nvSpPr>
-          <p:cNvPr id="6" name="Content Placeholder 5"/>
-          <p:cNvSpPr>
-            <a:spLocks noGrp="1"/>
-          </p:cNvSpPr>
-          <p:nvPr>
-            <p:ph sz="half" idx="2"/>
-          </p:nvPr>
-        </p:nvSpPr>
-        <p:spPr/>
-        <p:txBody>
-          <a:bodyPr>
-            <a:normAutofit fontScale="92500" lnSpcReduction="10000"/>
-          </a:bodyPr>
-          <a:lstStyle/>
-          <a:p>
-            <a:pPr marL="0" indent="0" algn="l" rtl="0">
-              <a:buNone/>
-            </a:pPr>
-            <a:r>
-              <a:rPr lang="en-GB" dirty="0"/>
-              <a:t>void </a:t>
-            </a:r>
-            <a:r>
-              <a:rPr lang="en-GB" dirty="0" smtClean="0"/>
-              <a:t>foo(</a:t>
-            </a:r>
-            <a:r>
-              <a:rPr lang="en-GB" dirty="0" err="1" smtClean="0"/>
-              <a:t>int</a:t>
-            </a:r>
-            <a:r>
-              <a:rPr lang="en-GB" dirty="0" smtClean="0"/>
-              <a:t> </a:t>
-            </a:r>
-            <a:r>
-              <a:rPr lang="en-GB" dirty="0"/>
-              <a:t>x) </a:t>
-            </a:r>
-            <a:endParaRPr lang="en-GB" dirty="0" smtClean="0"/>
-          </a:p>
-          <a:p>
-            <a:pPr marL="0" indent="0" algn="l" rtl="0">
-              <a:buNone/>
-            </a:pPr>
-            <a:r>
-              <a:rPr lang="en-GB" dirty="0" smtClean="0"/>
-              <a:t>{ </a:t>
-            </a:r>
-          </a:p>
-          <a:p>
-            <a:pPr marL="0" indent="0" algn="l" rtl="0">
-              <a:buNone/>
-            </a:pPr>
-            <a:r>
-              <a:rPr lang="en-GB" dirty="0" smtClean="0"/>
-              <a:t>    if (-1 &lt; x &amp;&amp; x &lt; 1) </a:t>
-            </a:r>
-            <a:r>
-              <a:rPr lang="en-GB" dirty="0"/>
-              <a:t>{ </a:t>
-            </a:r>
-            <a:endParaRPr lang="en-GB" dirty="0" smtClean="0"/>
-          </a:p>
-          <a:p>
-            <a:pPr marL="0" indent="0" algn="l" rtl="0">
-              <a:buNone/>
-            </a:pPr>
-            <a:r>
-              <a:rPr lang="en-GB" dirty="0"/>
-              <a:t> </a:t>
-            </a:r>
-            <a:r>
-              <a:rPr lang="en-GB" dirty="0" smtClean="0"/>
-              <a:t>         bar</a:t>
-            </a:r>
-            <a:r>
-              <a:rPr lang="en-GB" dirty="0"/>
-              <a:t>(); </a:t>
-            </a:r>
-            <a:endParaRPr lang="en-GB" dirty="0" smtClean="0"/>
-          </a:p>
-          <a:p>
-            <a:pPr marL="0" indent="0" algn="l" rtl="0">
-              <a:buNone/>
-            </a:pPr>
-            <a:r>
-              <a:rPr lang="en-GB" dirty="0"/>
-              <a:t> </a:t>
-            </a:r>
-            <a:r>
-              <a:rPr lang="en-GB" dirty="0" smtClean="0"/>
-              <a:t>         </a:t>
-            </a:r>
-            <a:r>
-              <a:rPr lang="en-GB" dirty="0" err="1" smtClean="0"/>
-              <a:t>baz</a:t>
-            </a:r>
-            <a:r>
-              <a:rPr lang="en-GB" dirty="0"/>
-              <a:t>(); </a:t>
-            </a:r>
-            <a:endParaRPr lang="en-GB" dirty="0" smtClean="0"/>
-          </a:p>
-          <a:p>
-            <a:pPr marL="0" indent="0" algn="l" rtl="0">
-              <a:buNone/>
-            </a:pPr>
-            <a:r>
-              <a:rPr lang="en-GB" dirty="0" smtClean="0"/>
-              <a:t>     } </a:t>
-            </a:r>
-            <a:r>
-              <a:rPr lang="en-GB" dirty="0"/>
-              <a:t>else { </a:t>
-            </a:r>
-            <a:endParaRPr lang="en-GB" dirty="0" smtClean="0"/>
-          </a:p>
-          <a:p>
-            <a:pPr marL="0" indent="0" algn="l" rtl="0">
-              <a:buNone/>
-            </a:pPr>
-            <a:r>
-              <a:rPr lang="en-GB" dirty="0"/>
-              <a:t> </a:t>
-            </a:r>
-            <a:r>
-              <a:rPr lang="en-GB" dirty="0" smtClean="0"/>
-              <a:t>         </a:t>
-            </a:r>
-            <a:r>
-              <a:rPr lang="en-GB" dirty="0" err="1" smtClean="0"/>
-              <a:t>qux</a:t>
-            </a:r>
-            <a:r>
-              <a:rPr lang="en-GB" dirty="0" smtClean="0"/>
-              <a:t>(x</a:t>
-            </a:r>
-            <a:r>
-              <a:rPr lang="en-GB" dirty="0"/>
-              <a:t>); </a:t>
-            </a:r>
-            <a:endParaRPr lang="en-GB" dirty="0" smtClean="0"/>
-          </a:p>
-          <a:p>
-            <a:pPr marL="0" indent="0" algn="l" rtl="0">
-              <a:buNone/>
-            </a:pPr>
-            <a:r>
-              <a:rPr lang="en-GB" dirty="0"/>
-              <a:t> </a:t>
-            </a:r>
-            <a:r>
-              <a:rPr lang="en-GB" dirty="0" smtClean="0"/>
-              <a:t>         foo(x </a:t>
-            </a:r>
-            <a:r>
-              <a:rPr lang="en-GB" dirty="0"/>
-              <a:t>- 1); </a:t>
-            </a:r>
-            <a:endParaRPr lang="en-GB" dirty="0" smtClean="0"/>
-          </a:p>
-          <a:p>
-            <a:pPr marL="0" indent="0" algn="l" rtl="0">
-              <a:buNone/>
-            </a:pPr>
-            <a:r>
-              <a:rPr lang="en-GB" dirty="0"/>
-              <a:t> </a:t>
-            </a:r>
-            <a:r>
-              <a:rPr lang="en-GB" dirty="0" smtClean="0"/>
-              <a:t>    } </a:t>
-            </a:r>
-          </a:p>
-          <a:p>
-            <a:pPr marL="0" indent="0" algn="l" rtl="0">
-              <a:buNone/>
-            </a:pPr>
-            <a:r>
-              <a:rPr lang="en-GB" dirty="0" smtClean="0"/>
-              <a:t>}</a:t>
-            </a:r>
-            <a:endParaRPr lang="he-IL" dirty="0"/>
-          </a:p>
-        </p:txBody>
-      </p:sp>
-      <p:sp>
-        <p:nvSpPr>
-          <p:cNvPr id="7" name="Text Placeholder 6"/>
-          <p:cNvSpPr>
-            <a:spLocks noGrp="1"/>
-          </p:cNvSpPr>
-          <p:nvPr>
-            <p:ph type="body" sz="quarter" idx="3"/>
-          </p:nvPr>
-        </p:nvSpPr>
-        <p:spPr/>
-        <p:txBody>
-          <a:bodyPr/>
-          <a:lstStyle/>
-          <a:p>
-            <a:pPr algn="l" rtl="0"/>
-            <a:r>
-              <a:rPr lang="en-US" dirty="0" smtClean="0"/>
-              <a:t>Python</a:t>
-            </a:r>
-            <a:endParaRPr lang="he-IL" dirty="0"/>
-          </a:p>
-        </p:txBody>
-      </p:sp>
-      <p:sp>
-        <p:nvSpPr>
-          <p:cNvPr id="8" name="Content Placeholder 7"/>
-          <p:cNvSpPr>
-            <a:spLocks noGrp="1"/>
-          </p:cNvSpPr>
-          <p:nvPr>
-            <p:ph sz="quarter" idx="4"/>
-          </p:nvPr>
-        </p:nvSpPr>
-        <p:spPr/>
-        <p:txBody>
-          <a:bodyPr/>
-          <a:lstStyle/>
-          <a:p>
-            <a:pPr marL="0" indent="0" algn="l" rtl="0">
-              <a:buNone/>
-            </a:pPr>
-            <a:r>
-              <a:rPr lang="en-US" dirty="0" err="1"/>
-              <a:t>def</a:t>
-            </a:r>
-            <a:r>
-              <a:rPr lang="en-US" dirty="0"/>
-              <a:t> foo(x):</a:t>
-            </a:r>
-          </a:p>
-          <a:p>
-            <a:pPr marL="0" indent="0" algn="l" rtl="0">
-              <a:buNone/>
-            </a:pPr>
-            <a:r>
-              <a:rPr lang="en-US" dirty="0"/>
-              <a:t>    if </a:t>
-            </a:r>
-            <a:r>
-              <a:rPr lang="en-US" dirty="0" smtClean="0"/>
-              <a:t>-1 &lt; x &lt; 1:</a:t>
-            </a:r>
-            <a:endParaRPr lang="en-US" dirty="0"/>
-          </a:p>
-          <a:p>
-            <a:pPr marL="0" indent="0" algn="l" rtl="0">
-              <a:buNone/>
-            </a:pPr>
-            <a:r>
-              <a:rPr lang="en-US" dirty="0"/>
-              <a:t>        bar()</a:t>
-            </a:r>
-          </a:p>
-          <a:p>
-            <a:pPr marL="0" indent="0" algn="l" rtl="0">
-              <a:buNone/>
-            </a:pPr>
-            <a:r>
-              <a:rPr lang="en-US" dirty="0"/>
-              <a:t>        </a:t>
-            </a:r>
-            <a:r>
-              <a:rPr lang="en-US" dirty="0" err="1"/>
-              <a:t>baz</a:t>
-            </a:r>
-            <a:r>
-              <a:rPr lang="en-US" dirty="0"/>
-              <a:t>()</a:t>
-            </a:r>
-          </a:p>
-          <a:p>
-            <a:pPr marL="0" indent="0" algn="l" rtl="0">
-              <a:buNone/>
-            </a:pPr>
-            <a:r>
-              <a:rPr lang="en-US" dirty="0"/>
-              <a:t>    else:</a:t>
-            </a:r>
-          </a:p>
-          <a:p>
-            <a:pPr marL="0" indent="0" algn="l" rtl="0">
-              <a:buNone/>
-            </a:pPr>
-            <a:r>
-              <a:rPr lang="en-US" dirty="0"/>
-              <a:t>        </a:t>
-            </a:r>
-            <a:r>
-              <a:rPr lang="en-US" dirty="0" err="1"/>
-              <a:t>qux</a:t>
-            </a:r>
-            <a:r>
-              <a:rPr lang="en-US" dirty="0"/>
-              <a:t>(x)</a:t>
-            </a:r>
-          </a:p>
-          <a:p>
-            <a:pPr marL="0" indent="0" algn="l" rtl="0">
-              <a:buNone/>
-            </a:pPr>
-            <a:r>
-              <a:rPr lang="en-US" dirty="0"/>
-              <a:t>        foo(x - 1)</a:t>
-            </a:r>
-            <a:endParaRPr lang="he-IL" dirty="0"/>
-          </a:p>
-        </p:txBody>
-      </p:sp>
-    </p:spTree>
-    <p:extLst>
-      <p:ext uri="{BB962C8B-B14F-4D97-AF65-F5344CB8AC3E}">
-        <p14:creationId xmlns:p14="http://schemas.microsoft.com/office/powerpoint/2010/main" val="2846433581"/>
-      </p:ext>
-    </p:extLst>
-  </p:cSld>
-  <p:clrMapOvr>
-    <a:masterClrMapping/>
-  </p:clrMapOvr>
-</p:sld>
-</file>
-
-<file path=ppt/slides/slide40.xml><?xml version="1.0" encoding="utf-8"?>
-<p:sld xmlns:a="http://schemas.openxmlformats.org/drawingml/2006/main" xmlns:r="http://schemas.openxmlformats.org/officeDocument/2006/relationships" xmlns:p="http://schemas.openxmlformats.org/presentationml/2006/main">
-  <p:cSld>
-    <p:spTree>
-      <p:nvGrpSpPr>
-        <p:cNvPr id="1" name=""/>
-        <p:cNvGrpSpPr/>
-        <p:nvPr/>
-      </p:nvGrpSpPr>
-      <p:grpSpPr>
-        <a:xfrm>
-          <a:off x="0" y="0"/>
-          <a:ext cx="0" cy="0"/>
-          <a:chOff x="0" y="0"/>
-          <a:chExt cx="0" cy="0"/>
-        </a:xfrm>
-      </p:grpSpPr>
-      <p:sp>
-        <p:nvSpPr>
           <p:cNvPr id="2" name="Title 1"/>
           <p:cNvSpPr>
             <a:spLocks noGrp="1"/>
@@ -8483,7 +8835,7 @@
 </p:sld>
 </file>
 
-<file path=ppt/slides/slide41.xml><?xml version="1.0" encoding="utf-8"?>
+<file path=ppt/slides/slide42.xml><?xml version="1.0" encoding="utf-8"?>
 <p:sld xmlns:a="http://schemas.openxmlformats.org/drawingml/2006/main" xmlns:r="http://schemas.openxmlformats.org/officeDocument/2006/relationships" xmlns:p="http://schemas.openxmlformats.org/presentationml/2006/main">
   <p:cSld>
     <p:spTree>
@@ -8670,7 +9022,7 @@
 </p:sld>
 </file>
 
-<file path=ppt/slides/slide42.xml><?xml version="1.0" encoding="utf-8"?>
+<file path=ppt/slides/slide43.xml><?xml version="1.0" encoding="utf-8"?>
 <p:sld xmlns:a="http://schemas.openxmlformats.org/drawingml/2006/main" xmlns:r="http://schemas.openxmlformats.org/officeDocument/2006/relationships" xmlns:p="http://schemas.openxmlformats.org/presentationml/2006/main">
   <p:cSld>
     <p:spTree>
@@ -8807,7 +9159,7 @@
 </p:sld>
 </file>
 
-<file path=ppt/slides/slide43.xml><?xml version="1.0" encoding="utf-8"?>
+<file path=ppt/slides/slide44.xml><?xml version="1.0" encoding="utf-8"?>
 <p:sld xmlns:a="http://schemas.openxmlformats.org/drawingml/2006/main" xmlns:r="http://schemas.openxmlformats.org/officeDocument/2006/relationships" xmlns:p="http://schemas.openxmlformats.org/presentationml/2006/main">
   <p:cSld>
     <p:spTree>
@@ -9165,24 +9517,13 @@
             <a:pPr algn="l" rtl="0"/>
             <a:r>
               <a:rPr lang="en-US" dirty="0" smtClean="0"/>
-              <a:t>Asynchronous programming (especially </a:t>
-            </a:r>
-            <a:r>
-              <a:rPr lang="en-US" dirty="0" err="1" smtClean="0"/>
-              <a:t>Py</a:t>
-            </a:r>
-            <a:r>
-              <a:rPr lang="en-US" dirty="0" smtClean="0"/>
-              <a:t> </a:t>
-            </a:r>
-            <a:r>
-              <a:rPr lang="en-US" dirty="0" smtClean="0"/>
-              <a:t>3.5</a:t>
-            </a:r>
-            <a:r>
-              <a:rPr lang="en-US" dirty="0" smtClean="0"/>
-              <a:t>)</a:t>
-            </a:r>
+              <a:t>Asynchronous </a:t>
+            </a:r>
+            <a:r>
+              <a:rPr lang="en-US" dirty="0" smtClean="0"/>
+              <a:t>programming</a:t>
+            </a:r>
+            <a:endParaRPr lang="en-US" dirty="0" smtClean="0"/>
           </a:p>
         </p:txBody>
       </p:sp>

</xml_diff>